<commit_message>
created index.html for Lab2
</commit_message>
<xml_diff>
--- a/week2/diagrams.pptx
+++ b/week2/diagrams.pptx
@@ -20,11 +20,12 @@
     <p:sldId id="269" r:id="rId14"/>
     <p:sldId id="268" r:id="rId15"/>
     <p:sldId id="270" r:id="rId16"/>
-    <p:sldId id="271" r:id="rId17"/>
-    <p:sldId id="272" r:id="rId18"/>
-    <p:sldId id="273" r:id="rId19"/>
-    <p:sldId id="274" r:id="rId20"/>
-    <p:sldId id="275" r:id="rId21"/>
+    <p:sldId id="276" r:id="rId17"/>
+    <p:sldId id="271" r:id="rId18"/>
+    <p:sldId id="272" r:id="rId19"/>
+    <p:sldId id="273" r:id="rId20"/>
+    <p:sldId id="274" r:id="rId21"/>
+    <p:sldId id="275" r:id="rId22"/>
   </p:sldIdLst>
   <p:sldSz cx="12192000" cy="6858000"/>
   <p:notesSz cx="6858000" cy="9144000"/>
@@ -280,7 +281,7 @@
           <a:p>
             <a:fld id="{98487E57-3337-4A1A-A228-63784EB4942D}" type="datetimeFigureOut">
               <a:rPr lang="en-CA" smtClean="0"/>
-              <a:t>2021-01-02</a:t>
+              <a:t>2021-01-14</a:t>
             </a:fld>
             <a:endParaRPr lang="en-CA"/>
           </a:p>
@@ -480,7 +481,7 @@
           <a:p>
             <a:fld id="{98487E57-3337-4A1A-A228-63784EB4942D}" type="datetimeFigureOut">
               <a:rPr lang="en-CA" smtClean="0"/>
-              <a:t>2021-01-02</a:t>
+              <a:t>2021-01-14</a:t>
             </a:fld>
             <a:endParaRPr lang="en-CA"/>
           </a:p>
@@ -690,7 +691,7 @@
           <a:p>
             <a:fld id="{98487E57-3337-4A1A-A228-63784EB4942D}" type="datetimeFigureOut">
               <a:rPr lang="en-CA" smtClean="0"/>
-              <a:t>2021-01-02</a:t>
+              <a:t>2021-01-14</a:t>
             </a:fld>
             <a:endParaRPr lang="en-CA"/>
           </a:p>
@@ -890,7 +891,7 @@
           <a:p>
             <a:fld id="{98487E57-3337-4A1A-A228-63784EB4942D}" type="datetimeFigureOut">
               <a:rPr lang="en-CA" smtClean="0"/>
-              <a:t>2021-01-02</a:t>
+              <a:t>2021-01-14</a:t>
             </a:fld>
             <a:endParaRPr lang="en-CA"/>
           </a:p>
@@ -1166,7 +1167,7 @@
           <a:p>
             <a:fld id="{98487E57-3337-4A1A-A228-63784EB4942D}" type="datetimeFigureOut">
               <a:rPr lang="en-CA" smtClean="0"/>
-              <a:t>2021-01-02</a:t>
+              <a:t>2021-01-14</a:t>
             </a:fld>
             <a:endParaRPr lang="en-CA"/>
           </a:p>
@@ -1434,7 +1435,7 @@
           <a:p>
             <a:fld id="{98487E57-3337-4A1A-A228-63784EB4942D}" type="datetimeFigureOut">
               <a:rPr lang="en-CA" smtClean="0"/>
-              <a:t>2021-01-02</a:t>
+              <a:t>2021-01-14</a:t>
             </a:fld>
             <a:endParaRPr lang="en-CA"/>
           </a:p>
@@ -1849,7 +1850,7 @@
           <a:p>
             <a:fld id="{98487E57-3337-4A1A-A228-63784EB4942D}" type="datetimeFigureOut">
               <a:rPr lang="en-CA" smtClean="0"/>
-              <a:t>2021-01-02</a:t>
+              <a:t>2021-01-14</a:t>
             </a:fld>
             <a:endParaRPr lang="en-CA"/>
           </a:p>
@@ -1991,7 +1992,7 @@
           <a:p>
             <a:fld id="{98487E57-3337-4A1A-A228-63784EB4942D}" type="datetimeFigureOut">
               <a:rPr lang="en-CA" smtClean="0"/>
-              <a:t>2021-01-02</a:t>
+              <a:t>2021-01-14</a:t>
             </a:fld>
             <a:endParaRPr lang="en-CA"/>
           </a:p>
@@ -2104,7 +2105,7 @@
           <a:p>
             <a:fld id="{98487E57-3337-4A1A-A228-63784EB4942D}" type="datetimeFigureOut">
               <a:rPr lang="en-CA" smtClean="0"/>
-              <a:t>2021-01-02</a:t>
+              <a:t>2021-01-14</a:t>
             </a:fld>
             <a:endParaRPr lang="en-CA"/>
           </a:p>
@@ -2417,7 +2418,7 @@
           <a:p>
             <a:fld id="{98487E57-3337-4A1A-A228-63784EB4942D}" type="datetimeFigureOut">
               <a:rPr lang="en-CA" smtClean="0"/>
-              <a:t>2021-01-02</a:t>
+              <a:t>2021-01-14</a:t>
             </a:fld>
             <a:endParaRPr lang="en-CA"/>
           </a:p>
@@ -2706,7 +2707,7 @@
           <a:p>
             <a:fld id="{98487E57-3337-4A1A-A228-63784EB4942D}" type="datetimeFigureOut">
               <a:rPr lang="en-CA" smtClean="0"/>
-              <a:t>2021-01-02</a:t>
+              <a:t>2021-01-14</a:t>
             </a:fld>
             <a:endParaRPr lang="en-CA"/>
           </a:p>
@@ -2949,7 +2950,7 @@
           <a:p>
             <a:fld id="{98487E57-3337-4A1A-A228-63784EB4942D}" type="datetimeFigureOut">
               <a:rPr lang="en-CA" smtClean="0"/>
-              <a:t>2021-01-02</a:t>
+              <a:t>2021-01-14</a:t>
             </a:fld>
             <a:endParaRPr lang="en-CA"/>
           </a:p>
@@ -6394,39 +6395,2139 @@
           <a:chExt cx="0" cy="0"/>
         </a:xfrm>
       </p:grpSpPr>
-      <p:pic>
-        <p:nvPicPr>
-          <p:cNvPr id="5" name="Picture 4">
-            <a:extLst>
-              <a:ext uri="{FF2B5EF4-FFF2-40B4-BE49-F238E27FC236}">
-                <a16:creationId xmlns:a16="http://schemas.microsoft.com/office/drawing/2014/main" id="{1E60588B-FB51-4270-85C6-C9F76575D76B}"/>
-              </a:ext>
-            </a:extLst>
-          </p:cNvPr>
-          <p:cNvPicPr>
-            <a:picLocks noChangeAspect="1"/>
-          </p:cNvPicPr>
-          <p:nvPr/>
-        </p:nvPicPr>
-        <p:blipFill rotWithShape="1">
-          <a:blip r:embed="rId2"/>
-          <a:srcRect l="17329" t="44173" r="75078" b="51269"/>
-          <a:stretch/>
-        </p:blipFill>
-        <p:spPr>
-          <a:xfrm>
-            <a:off x="2112774" y="2476264"/>
-            <a:ext cx="2672480" cy="868964"/>
+      <p:sp>
+        <p:nvSpPr>
+          <p:cNvPr id="55" name="Freeform: Shape 54">
+            <a:extLst>
+              <a:ext uri="{FF2B5EF4-FFF2-40B4-BE49-F238E27FC236}">
+                <a16:creationId xmlns:a16="http://schemas.microsoft.com/office/drawing/2014/main" id="{9FEA0874-D852-421C-9FC6-1567C41B3202}"/>
+              </a:ext>
+            </a:extLst>
+          </p:cNvPr>
+          <p:cNvSpPr/>
+          <p:nvPr/>
+        </p:nvSpPr>
+        <p:spPr>
+          <a:xfrm flipH="1">
+            <a:off x="8884176" y="2402361"/>
+            <a:ext cx="654786" cy="1232010"/>
+          </a:xfrm>
+          <a:custGeom>
+            <a:avLst/>
+            <a:gdLst>
+              <a:gd name="connsiteX0" fmla="*/ 1159 w 511738"/>
+              <a:gd name="connsiteY0" fmla="*/ 0 h 798360"/>
+              <a:gd name="connsiteX1" fmla="*/ 80067 w 511738"/>
+              <a:gd name="connsiteY1" fmla="*/ 468804 h 798360"/>
+              <a:gd name="connsiteX2" fmla="*/ 511738 w 511738"/>
+              <a:gd name="connsiteY2" fmla="*/ 798360 h 798360"/>
+              <a:gd name="connsiteX3" fmla="*/ 511738 w 511738"/>
+              <a:gd name="connsiteY3" fmla="*/ 798360 h 798360"/>
+              <a:gd name="connsiteX0" fmla="*/ 219 w 510798"/>
+              <a:gd name="connsiteY0" fmla="*/ 0 h 798360"/>
+              <a:gd name="connsiteX1" fmla="*/ 111618 w 510798"/>
+              <a:gd name="connsiteY1" fmla="*/ 533787 h 798360"/>
+              <a:gd name="connsiteX2" fmla="*/ 510798 w 510798"/>
+              <a:gd name="connsiteY2" fmla="*/ 798360 h 798360"/>
+              <a:gd name="connsiteX3" fmla="*/ 510798 w 510798"/>
+              <a:gd name="connsiteY3" fmla="*/ 798360 h 798360"/>
+            </a:gdLst>
+            <a:ahLst/>
+            <a:cxnLst>
+              <a:cxn ang="0">
+                <a:pos x="connsiteX0" y="connsiteY0"/>
+              </a:cxn>
+              <a:cxn ang="0">
+                <a:pos x="connsiteX1" y="connsiteY1"/>
+              </a:cxn>
+              <a:cxn ang="0">
+                <a:pos x="connsiteX2" y="connsiteY2"/>
+              </a:cxn>
+              <a:cxn ang="0">
+                <a:pos x="connsiteX3" y="connsiteY3"/>
+              </a:cxn>
+            </a:cxnLst>
+            <a:rect l="l" t="t" r="r" b="b"/>
+            <a:pathLst>
+              <a:path w="510798" h="798360">
+                <a:moveTo>
+                  <a:pt x="219" y="0"/>
+                </a:moveTo>
+                <a:cubicBezTo>
+                  <a:pt x="-2876" y="167872"/>
+                  <a:pt x="26521" y="400727"/>
+                  <a:pt x="111618" y="533787"/>
+                </a:cubicBezTo>
+                <a:cubicBezTo>
+                  <a:pt x="196715" y="666847"/>
+                  <a:pt x="510798" y="798360"/>
+                  <a:pt x="510798" y="798360"/>
+                </a:cubicBezTo>
+                <a:lnTo>
+                  <a:pt x="510798" y="798360"/>
+                </a:lnTo>
+              </a:path>
+            </a:pathLst>
+          </a:custGeom>
+          <a:noFill/>
+          <a:ln w="66675">
+            <a:solidFill>
+              <a:srgbClr val="FFC000"/>
+            </a:solidFill>
+          </a:ln>
+        </p:spPr>
+        <p:style>
+          <a:lnRef idx="2">
+            <a:schemeClr val="accent1">
+              <a:shade val="50000"/>
+            </a:schemeClr>
+          </a:lnRef>
+          <a:fillRef idx="1">
+            <a:schemeClr val="accent1"/>
+          </a:fillRef>
+          <a:effectRef idx="0">
+            <a:schemeClr val="accent1"/>
+          </a:effectRef>
+          <a:fontRef idx="minor">
+            <a:schemeClr val="lt1"/>
+          </a:fontRef>
+        </p:style>
+        <p:txBody>
+          <a:bodyPr rtlCol="0" anchor="ctr"/>
+          <a:lstStyle/>
+          <a:p>
+            <a:pPr algn="ctr"/>
+            <a:endParaRPr lang="en-CA"/>
+          </a:p>
+        </p:txBody>
+      </p:sp>
+      <p:sp>
+        <p:nvSpPr>
+          <p:cNvPr id="38" name="Freeform: Shape 37">
+            <a:extLst>
+              <a:ext uri="{FF2B5EF4-FFF2-40B4-BE49-F238E27FC236}">
+                <a16:creationId xmlns:a16="http://schemas.microsoft.com/office/drawing/2014/main" id="{82D6A518-57F3-4403-95D6-29B96BF674CB}"/>
+              </a:ext>
+            </a:extLst>
+          </p:cNvPr>
+          <p:cNvSpPr/>
+          <p:nvPr/>
+        </p:nvSpPr>
+        <p:spPr>
+          <a:xfrm>
+            <a:off x="4460712" y="2387600"/>
+            <a:ext cx="994027" cy="2301618"/>
+          </a:xfrm>
+          <a:custGeom>
+            <a:avLst/>
+            <a:gdLst>
+              <a:gd name="connsiteX0" fmla="*/ 1159 w 511738"/>
+              <a:gd name="connsiteY0" fmla="*/ 0 h 798360"/>
+              <a:gd name="connsiteX1" fmla="*/ 80067 w 511738"/>
+              <a:gd name="connsiteY1" fmla="*/ 468804 h 798360"/>
+              <a:gd name="connsiteX2" fmla="*/ 511738 w 511738"/>
+              <a:gd name="connsiteY2" fmla="*/ 798360 h 798360"/>
+              <a:gd name="connsiteX3" fmla="*/ 511738 w 511738"/>
+              <a:gd name="connsiteY3" fmla="*/ 798360 h 798360"/>
+              <a:gd name="connsiteX0" fmla="*/ 219 w 510798"/>
+              <a:gd name="connsiteY0" fmla="*/ 0 h 798360"/>
+              <a:gd name="connsiteX1" fmla="*/ 111618 w 510798"/>
+              <a:gd name="connsiteY1" fmla="*/ 533787 h 798360"/>
+              <a:gd name="connsiteX2" fmla="*/ 510798 w 510798"/>
+              <a:gd name="connsiteY2" fmla="*/ 798360 h 798360"/>
+              <a:gd name="connsiteX3" fmla="*/ 510798 w 510798"/>
+              <a:gd name="connsiteY3" fmla="*/ 798360 h 798360"/>
+            </a:gdLst>
+            <a:ahLst/>
+            <a:cxnLst>
+              <a:cxn ang="0">
+                <a:pos x="connsiteX0" y="connsiteY0"/>
+              </a:cxn>
+              <a:cxn ang="0">
+                <a:pos x="connsiteX1" y="connsiteY1"/>
+              </a:cxn>
+              <a:cxn ang="0">
+                <a:pos x="connsiteX2" y="connsiteY2"/>
+              </a:cxn>
+              <a:cxn ang="0">
+                <a:pos x="connsiteX3" y="connsiteY3"/>
+              </a:cxn>
+            </a:cxnLst>
+            <a:rect l="l" t="t" r="r" b="b"/>
+            <a:pathLst>
+              <a:path w="510798" h="798360">
+                <a:moveTo>
+                  <a:pt x="219" y="0"/>
+                </a:moveTo>
+                <a:cubicBezTo>
+                  <a:pt x="-2876" y="167872"/>
+                  <a:pt x="26521" y="400727"/>
+                  <a:pt x="111618" y="533787"/>
+                </a:cubicBezTo>
+                <a:cubicBezTo>
+                  <a:pt x="196715" y="666847"/>
+                  <a:pt x="510798" y="798360"/>
+                  <a:pt x="510798" y="798360"/>
+                </a:cubicBezTo>
+                <a:lnTo>
+                  <a:pt x="510798" y="798360"/>
+                </a:lnTo>
+              </a:path>
+            </a:pathLst>
+          </a:custGeom>
+          <a:noFill/>
+          <a:ln w="66675">
+            <a:solidFill>
+              <a:srgbClr val="FF0000"/>
+            </a:solidFill>
+          </a:ln>
+        </p:spPr>
+        <p:style>
+          <a:lnRef idx="2">
+            <a:schemeClr val="accent1">
+              <a:shade val="50000"/>
+            </a:schemeClr>
+          </a:lnRef>
+          <a:fillRef idx="1">
+            <a:schemeClr val="accent1"/>
+          </a:fillRef>
+          <a:effectRef idx="0">
+            <a:schemeClr val="accent1"/>
+          </a:effectRef>
+          <a:fontRef idx="minor">
+            <a:schemeClr val="lt1"/>
+          </a:fontRef>
+        </p:style>
+        <p:txBody>
+          <a:bodyPr rtlCol="0" anchor="ctr"/>
+          <a:lstStyle/>
+          <a:p>
+            <a:pPr algn="ctr"/>
+            <a:endParaRPr lang="en-CA"/>
+          </a:p>
+        </p:txBody>
+      </p:sp>
+      <p:cxnSp>
+        <p:nvCxnSpPr>
+          <p:cNvPr id="5" name="Straight Connector 4">
+            <a:extLst>
+              <a:ext uri="{FF2B5EF4-FFF2-40B4-BE49-F238E27FC236}">
+                <a16:creationId xmlns:a16="http://schemas.microsoft.com/office/drawing/2014/main" id="{EA87F939-6A32-4CC2-B25C-3F1224AADA10}"/>
+              </a:ext>
+            </a:extLst>
+          </p:cNvPr>
+          <p:cNvCxnSpPr>
+            <a:cxnSpLocks/>
+          </p:cNvCxnSpPr>
+          <p:nvPr/>
+        </p:nvCxnSpPr>
+        <p:spPr>
+          <a:xfrm>
+            <a:off x="1411054" y="2369654"/>
+            <a:ext cx="10671717" cy="0"/>
+          </a:xfrm>
+          <a:prstGeom prst="line">
+            <a:avLst/>
+          </a:prstGeom>
+          <a:ln w="66675"/>
+        </p:spPr>
+        <p:style>
+          <a:lnRef idx="1">
+            <a:schemeClr val="accent1"/>
+          </a:lnRef>
+          <a:fillRef idx="0">
+            <a:schemeClr val="accent1"/>
+          </a:fillRef>
+          <a:effectRef idx="0">
+            <a:schemeClr val="accent1"/>
+          </a:effectRef>
+          <a:fontRef idx="minor">
+            <a:schemeClr val="tx1"/>
+          </a:fontRef>
+        </p:style>
+      </p:cxnSp>
+      <p:cxnSp>
+        <p:nvCxnSpPr>
+          <p:cNvPr id="6" name="Straight Connector 5">
+            <a:extLst>
+              <a:ext uri="{FF2B5EF4-FFF2-40B4-BE49-F238E27FC236}">
+                <a16:creationId xmlns:a16="http://schemas.microsoft.com/office/drawing/2014/main" id="{4D7323B2-3805-4377-9E83-3F61411D0627}"/>
+              </a:ext>
+            </a:extLst>
+          </p:cNvPr>
+          <p:cNvCxnSpPr>
+            <a:cxnSpLocks/>
+          </p:cNvCxnSpPr>
+          <p:nvPr/>
+        </p:nvCxnSpPr>
+        <p:spPr>
+          <a:xfrm flipV="1">
+            <a:off x="3459344" y="3610020"/>
+            <a:ext cx="5294876" cy="2"/>
+          </a:xfrm>
+          <a:prstGeom prst="line">
+            <a:avLst/>
+          </a:prstGeom>
+          <a:ln w="66675">
+            <a:solidFill>
+              <a:srgbClr val="FFC000"/>
+            </a:solidFill>
+          </a:ln>
+        </p:spPr>
+        <p:style>
+          <a:lnRef idx="1">
+            <a:schemeClr val="accent1"/>
+          </a:lnRef>
+          <a:fillRef idx="0">
+            <a:schemeClr val="accent1"/>
+          </a:fillRef>
+          <a:effectRef idx="0">
+            <a:schemeClr val="accent1"/>
+          </a:effectRef>
+          <a:fontRef idx="minor">
+            <a:schemeClr val="tx1"/>
+          </a:fontRef>
+        </p:style>
+      </p:cxnSp>
+      <p:sp>
+        <p:nvSpPr>
+          <p:cNvPr id="7" name="Freeform: Shape 6">
+            <a:extLst>
+              <a:ext uri="{FF2B5EF4-FFF2-40B4-BE49-F238E27FC236}">
+                <a16:creationId xmlns:a16="http://schemas.microsoft.com/office/drawing/2014/main" id="{0F39F0D1-FAB9-4E60-8D6D-DD163B62A3CA}"/>
+              </a:ext>
+            </a:extLst>
+          </p:cNvPr>
+          <p:cNvSpPr/>
+          <p:nvPr/>
+        </p:nvSpPr>
+        <p:spPr>
+          <a:xfrm>
+            <a:off x="2976728" y="2404533"/>
+            <a:ext cx="533575" cy="1205485"/>
+          </a:xfrm>
+          <a:custGeom>
+            <a:avLst/>
+            <a:gdLst>
+              <a:gd name="connsiteX0" fmla="*/ 1159 w 511738"/>
+              <a:gd name="connsiteY0" fmla="*/ 0 h 798360"/>
+              <a:gd name="connsiteX1" fmla="*/ 80067 w 511738"/>
+              <a:gd name="connsiteY1" fmla="*/ 468804 h 798360"/>
+              <a:gd name="connsiteX2" fmla="*/ 511738 w 511738"/>
+              <a:gd name="connsiteY2" fmla="*/ 798360 h 798360"/>
+              <a:gd name="connsiteX3" fmla="*/ 511738 w 511738"/>
+              <a:gd name="connsiteY3" fmla="*/ 798360 h 798360"/>
+              <a:gd name="connsiteX0" fmla="*/ 219 w 510798"/>
+              <a:gd name="connsiteY0" fmla="*/ 0 h 798360"/>
+              <a:gd name="connsiteX1" fmla="*/ 111618 w 510798"/>
+              <a:gd name="connsiteY1" fmla="*/ 533787 h 798360"/>
+              <a:gd name="connsiteX2" fmla="*/ 510798 w 510798"/>
+              <a:gd name="connsiteY2" fmla="*/ 798360 h 798360"/>
+              <a:gd name="connsiteX3" fmla="*/ 510798 w 510798"/>
+              <a:gd name="connsiteY3" fmla="*/ 798360 h 798360"/>
+            </a:gdLst>
+            <a:ahLst/>
+            <a:cxnLst>
+              <a:cxn ang="0">
+                <a:pos x="connsiteX0" y="connsiteY0"/>
+              </a:cxn>
+              <a:cxn ang="0">
+                <a:pos x="connsiteX1" y="connsiteY1"/>
+              </a:cxn>
+              <a:cxn ang="0">
+                <a:pos x="connsiteX2" y="connsiteY2"/>
+              </a:cxn>
+              <a:cxn ang="0">
+                <a:pos x="connsiteX3" y="connsiteY3"/>
+              </a:cxn>
+            </a:cxnLst>
+            <a:rect l="l" t="t" r="r" b="b"/>
+            <a:pathLst>
+              <a:path w="510798" h="798360">
+                <a:moveTo>
+                  <a:pt x="219" y="0"/>
+                </a:moveTo>
+                <a:cubicBezTo>
+                  <a:pt x="-2876" y="167872"/>
+                  <a:pt x="26521" y="400727"/>
+                  <a:pt x="111618" y="533787"/>
+                </a:cubicBezTo>
+                <a:cubicBezTo>
+                  <a:pt x="196715" y="666847"/>
+                  <a:pt x="510798" y="798360"/>
+                  <a:pt x="510798" y="798360"/>
+                </a:cubicBezTo>
+                <a:lnTo>
+                  <a:pt x="510798" y="798360"/>
+                </a:lnTo>
+              </a:path>
+            </a:pathLst>
+          </a:custGeom>
+          <a:noFill/>
+          <a:ln w="66675">
+            <a:solidFill>
+              <a:srgbClr val="FFC000"/>
+            </a:solidFill>
+          </a:ln>
+        </p:spPr>
+        <p:style>
+          <a:lnRef idx="2">
+            <a:schemeClr val="accent1">
+              <a:shade val="50000"/>
+            </a:schemeClr>
+          </a:lnRef>
+          <a:fillRef idx="1">
+            <a:schemeClr val="accent1"/>
+          </a:fillRef>
+          <a:effectRef idx="0">
+            <a:schemeClr val="accent1"/>
+          </a:effectRef>
+          <a:fontRef idx="minor">
+            <a:schemeClr val="lt1"/>
+          </a:fontRef>
+        </p:style>
+        <p:txBody>
+          <a:bodyPr rtlCol="0" anchor="ctr"/>
+          <a:lstStyle/>
+          <a:p>
+            <a:pPr algn="ctr"/>
+            <a:endParaRPr lang="en-CA"/>
+          </a:p>
+        </p:txBody>
+      </p:sp>
+      <p:sp>
+        <p:nvSpPr>
+          <p:cNvPr id="10" name="Oval 9">
+            <a:extLst>
+              <a:ext uri="{FF2B5EF4-FFF2-40B4-BE49-F238E27FC236}">
+                <a16:creationId xmlns:a16="http://schemas.microsoft.com/office/drawing/2014/main" id="{2EF90795-B85D-4FD5-A5EF-2B0F343867A6}"/>
+              </a:ext>
+            </a:extLst>
+          </p:cNvPr>
+          <p:cNvSpPr/>
+          <p:nvPr/>
+        </p:nvSpPr>
+        <p:spPr>
+          <a:xfrm>
+            <a:off x="3499785" y="2197917"/>
+            <a:ext cx="329555" cy="343474"/>
+          </a:xfrm>
+          <a:prstGeom prst="ellipse">
+            <a:avLst/>
+          </a:prstGeom>
+        </p:spPr>
+        <p:style>
+          <a:lnRef idx="2">
+            <a:schemeClr val="accent1">
+              <a:shade val="50000"/>
+            </a:schemeClr>
+          </a:lnRef>
+          <a:fillRef idx="1">
+            <a:schemeClr val="accent1"/>
+          </a:fillRef>
+          <a:effectRef idx="0">
+            <a:schemeClr val="accent1"/>
+          </a:effectRef>
+          <a:fontRef idx="minor">
+            <a:schemeClr val="lt1"/>
+          </a:fontRef>
+        </p:style>
+        <p:txBody>
+          <a:bodyPr lIns="0" tIns="0" rIns="0" bIns="0" rtlCol="0" anchor="ctr"/>
+          <a:lstStyle/>
+          <a:p>
+            <a:pPr algn="ctr"/>
+            <a:r>
+              <a:rPr lang="en-CA" sz="700" dirty="0"/>
+              <a:t>comm</a:t>
+            </a:r>
+          </a:p>
+        </p:txBody>
+      </p:sp>
+      <p:sp>
+        <p:nvSpPr>
+          <p:cNvPr id="11" name="Oval 10">
+            <a:extLst>
+              <a:ext uri="{FF2B5EF4-FFF2-40B4-BE49-F238E27FC236}">
+                <a16:creationId xmlns:a16="http://schemas.microsoft.com/office/drawing/2014/main" id="{558256ED-69F8-40CE-921D-19640689A15A}"/>
+              </a:ext>
+            </a:extLst>
+          </p:cNvPr>
+          <p:cNvSpPr/>
+          <p:nvPr/>
+        </p:nvSpPr>
+        <p:spPr>
+          <a:xfrm>
+            <a:off x="2086965" y="2197917"/>
+            <a:ext cx="329555" cy="343474"/>
+          </a:xfrm>
+          <a:prstGeom prst="ellipse">
+            <a:avLst/>
+          </a:prstGeom>
+        </p:spPr>
+        <p:style>
+          <a:lnRef idx="2">
+            <a:schemeClr val="accent1">
+              <a:shade val="50000"/>
+            </a:schemeClr>
+          </a:lnRef>
+          <a:fillRef idx="1">
+            <a:schemeClr val="accent1"/>
+          </a:fillRef>
+          <a:effectRef idx="0">
+            <a:schemeClr val="accent1"/>
+          </a:effectRef>
+          <a:fontRef idx="minor">
+            <a:schemeClr val="lt1"/>
+          </a:fontRef>
+        </p:style>
+        <p:txBody>
+          <a:bodyPr lIns="0" tIns="0" rIns="0" bIns="0" rtlCol="0" anchor="ctr"/>
+          <a:lstStyle/>
+          <a:p>
+            <a:pPr algn="ctr"/>
+            <a:r>
+              <a:rPr lang="en-CA" sz="700" dirty="0"/>
+              <a:t>comm</a:t>
+            </a:r>
+          </a:p>
+        </p:txBody>
+      </p:sp>
+      <p:sp>
+        <p:nvSpPr>
+          <p:cNvPr id="15" name="Oval 14">
+            <a:extLst>
+              <a:ext uri="{FF2B5EF4-FFF2-40B4-BE49-F238E27FC236}">
+                <a16:creationId xmlns:a16="http://schemas.microsoft.com/office/drawing/2014/main" id="{6BB8E0C3-4A97-4782-BE5B-DCD2CE2AEB39}"/>
+              </a:ext>
+            </a:extLst>
+          </p:cNvPr>
+          <p:cNvSpPr/>
+          <p:nvPr/>
+        </p:nvSpPr>
+        <p:spPr>
+          <a:xfrm>
+            <a:off x="4974273" y="2215270"/>
+            <a:ext cx="329555" cy="343474"/>
+          </a:xfrm>
+          <a:prstGeom prst="ellipse">
+            <a:avLst/>
+          </a:prstGeom>
+        </p:spPr>
+        <p:style>
+          <a:lnRef idx="2">
+            <a:schemeClr val="accent1">
+              <a:shade val="50000"/>
+            </a:schemeClr>
+          </a:lnRef>
+          <a:fillRef idx="1">
+            <a:schemeClr val="accent1"/>
+          </a:fillRef>
+          <a:effectRef idx="0">
+            <a:schemeClr val="accent1"/>
+          </a:effectRef>
+          <a:fontRef idx="minor">
+            <a:schemeClr val="lt1"/>
+          </a:fontRef>
+        </p:style>
+        <p:txBody>
+          <a:bodyPr lIns="0" tIns="0" rIns="0" bIns="0" rtlCol="0" anchor="ctr"/>
+          <a:lstStyle/>
+          <a:p>
+            <a:pPr algn="ctr"/>
+            <a:r>
+              <a:rPr lang="en-CA" sz="700" dirty="0"/>
+              <a:t>comm</a:t>
+            </a:r>
+          </a:p>
+        </p:txBody>
+      </p:sp>
+      <p:sp>
+        <p:nvSpPr>
+          <p:cNvPr id="16" name="Oval 15">
+            <a:extLst>
+              <a:ext uri="{FF2B5EF4-FFF2-40B4-BE49-F238E27FC236}">
+                <a16:creationId xmlns:a16="http://schemas.microsoft.com/office/drawing/2014/main" id="{4D153017-A8F8-432E-912C-29895D493E94}"/>
+              </a:ext>
+            </a:extLst>
+          </p:cNvPr>
+          <p:cNvSpPr/>
+          <p:nvPr/>
+        </p:nvSpPr>
+        <p:spPr>
+          <a:xfrm>
+            <a:off x="5711517" y="2215270"/>
+            <a:ext cx="329555" cy="343474"/>
+          </a:xfrm>
+          <a:prstGeom prst="ellipse">
+            <a:avLst/>
+          </a:prstGeom>
+        </p:spPr>
+        <p:style>
+          <a:lnRef idx="2">
+            <a:schemeClr val="accent1">
+              <a:shade val="50000"/>
+            </a:schemeClr>
+          </a:lnRef>
+          <a:fillRef idx="1">
+            <a:schemeClr val="accent1"/>
+          </a:fillRef>
+          <a:effectRef idx="0">
+            <a:schemeClr val="accent1"/>
+          </a:effectRef>
+          <a:fontRef idx="minor">
+            <a:schemeClr val="lt1"/>
+          </a:fontRef>
+        </p:style>
+        <p:txBody>
+          <a:bodyPr lIns="0" tIns="0" rIns="0" bIns="0" rtlCol="0" anchor="ctr"/>
+          <a:lstStyle/>
+          <a:p>
+            <a:pPr algn="ctr"/>
+            <a:r>
+              <a:rPr lang="en-CA" sz="700" dirty="0"/>
+              <a:t>comm</a:t>
+            </a:r>
+          </a:p>
+        </p:txBody>
+      </p:sp>
+      <p:sp>
+        <p:nvSpPr>
+          <p:cNvPr id="17" name="Oval 16">
+            <a:extLst>
+              <a:ext uri="{FF2B5EF4-FFF2-40B4-BE49-F238E27FC236}">
+                <a16:creationId xmlns:a16="http://schemas.microsoft.com/office/drawing/2014/main" id="{973AB650-29B7-4BD4-840C-8AD53D8F4826}"/>
+              </a:ext>
+            </a:extLst>
+          </p:cNvPr>
+          <p:cNvSpPr/>
+          <p:nvPr/>
+        </p:nvSpPr>
+        <p:spPr>
+          <a:xfrm>
+            <a:off x="6448761" y="2215270"/>
+            <a:ext cx="329555" cy="343474"/>
+          </a:xfrm>
+          <a:prstGeom prst="ellipse">
+            <a:avLst/>
+          </a:prstGeom>
+        </p:spPr>
+        <p:style>
+          <a:lnRef idx="2">
+            <a:schemeClr val="accent1">
+              <a:shade val="50000"/>
+            </a:schemeClr>
+          </a:lnRef>
+          <a:fillRef idx="1">
+            <a:schemeClr val="accent1"/>
+          </a:fillRef>
+          <a:effectRef idx="0">
+            <a:schemeClr val="accent1"/>
+          </a:effectRef>
+          <a:fontRef idx="minor">
+            <a:schemeClr val="lt1"/>
+          </a:fontRef>
+        </p:style>
+        <p:txBody>
+          <a:bodyPr lIns="0" tIns="0" rIns="0" bIns="0" rtlCol="0" anchor="ctr"/>
+          <a:lstStyle/>
+          <a:p>
+            <a:pPr algn="ctr"/>
+            <a:r>
+              <a:rPr lang="en-CA" sz="700" dirty="0"/>
+              <a:t>comm</a:t>
+            </a:r>
+          </a:p>
+        </p:txBody>
+      </p:sp>
+      <p:sp>
+        <p:nvSpPr>
+          <p:cNvPr id="18" name="Oval 17">
+            <a:extLst>
+              <a:ext uri="{FF2B5EF4-FFF2-40B4-BE49-F238E27FC236}">
+                <a16:creationId xmlns:a16="http://schemas.microsoft.com/office/drawing/2014/main" id="{54EA6DB9-B5F0-4572-A3DE-00DDA7A8FFDD}"/>
+              </a:ext>
+            </a:extLst>
+          </p:cNvPr>
+          <p:cNvSpPr/>
+          <p:nvPr/>
+        </p:nvSpPr>
+        <p:spPr>
+          <a:xfrm>
+            <a:off x="7186005" y="2215270"/>
+            <a:ext cx="329555" cy="343474"/>
+          </a:xfrm>
+          <a:prstGeom prst="ellipse">
+            <a:avLst/>
+          </a:prstGeom>
+        </p:spPr>
+        <p:style>
+          <a:lnRef idx="2">
+            <a:schemeClr val="accent1">
+              <a:shade val="50000"/>
+            </a:schemeClr>
+          </a:lnRef>
+          <a:fillRef idx="1">
+            <a:schemeClr val="accent1"/>
+          </a:fillRef>
+          <a:effectRef idx="0">
+            <a:schemeClr val="accent1"/>
+          </a:effectRef>
+          <a:fontRef idx="minor">
+            <a:schemeClr val="lt1"/>
+          </a:fontRef>
+        </p:style>
+        <p:txBody>
+          <a:bodyPr lIns="0" tIns="0" rIns="0" bIns="0" rtlCol="0" anchor="ctr"/>
+          <a:lstStyle/>
+          <a:p>
+            <a:pPr algn="ctr"/>
+            <a:r>
+              <a:rPr lang="en-CA" sz="700" dirty="0"/>
+              <a:t>comm</a:t>
+            </a:r>
+          </a:p>
+        </p:txBody>
+      </p:sp>
+      <p:sp>
+        <p:nvSpPr>
+          <p:cNvPr id="19" name="Oval 18">
+            <a:extLst>
+              <a:ext uri="{FF2B5EF4-FFF2-40B4-BE49-F238E27FC236}">
+                <a16:creationId xmlns:a16="http://schemas.microsoft.com/office/drawing/2014/main" id="{E02A4D56-D9A5-4278-BEE0-46A208E789E8}"/>
+              </a:ext>
+            </a:extLst>
+          </p:cNvPr>
+          <p:cNvSpPr/>
+          <p:nvPr/>
+        </p:nvSpPr>
+        <p:spPr>
+          <a:xfrm>
+            <a:off x="7923249" y="2215270"/>
+            <a:ext cx="329555" cy="343474"/>
+          </a:xfrm>
+          <a:prstGeom prst="ellipse">
+            <a:avLst/>
+          </a:prstGeom>
+        </p:spPr>
+        <p:style>
+          <a:lnRef idx="2">
+            <a:schemeClr val="accent1">
+              <a:shade val="50000"/>
+            </a:schemeClr>
+          </a:lnRef>
+          <a:fillRef idx="1">
+            <a:schemeClr val="accent1"/>
+          </a:fillRef>
+          <a:effectRef idx="0">
+            <a:schemeClr val="accent1"/>
+          </a:effectRef>
+          <a:fontRef idx="minor">
+            <a:schemeClr val="lt1"/>
+          </a:fontRef>
+        </p:style>
+        <p:txBody>
+          <a:bodyPr lIns="0" tIns="0" rIns="0" bIns="0" rtlCol="0" anchor="ctr"/>
+          <a:lstStyle/>
+          <a:p>
+            <a:pPr algn="ctr"/>
+            <a:r>
+              <a:rPr lang="en-CA" sz="700" dirty="0"/>
+              <a:t>comm</a:t>
+            </a:r>
+          </a:p>
+        </p:txBody>
+      </p:sp>
+      <p:sp>
+        <p:nvSpPr>
+          <p:cNvPr id="20" name="Oval 19">
+            <a:extLst>
+              <a:ext uri="{FF2B5EF4-FFF2-40B4-BE49-F238E27FC236}">
+                <a16:creationId xmlns:a16="http://schemas.microsoft.com/office/drawing/2014/main" id="{9B87AF79-FBE7-46F5-AF87-7E0F8B3B278F}"/>
+              </a:ext>
+            </a:extLst>
+          </p:cNvPr>
+          <p:cNvSpPr/>
+          <p:nvPr/>
+        </p:nvSpPr>
+        <p:spPr>
+          <a:xfrm>
+            <a:off x="8660493" y="2215270"/>
+            <a:ext cx="329555" cy="343474"/>
+          </a:xfrm>
+          <a:prstGeom prst="ellipse">
+            <a:avLst/>
+          </a:prstGeom>
+        </p:spPr>
+        <p:style>
+          <a:lnRef idx="2">
+            <a:schemeClr val="accent1">
+              <a:shade val="50000"/>
+            </a:schemeClr>
+          </a:lnRef>
+          <a:fillRef idx="1">
+            <a:schemeClr val="accent1"/>
+          </a:fillRef>
+          <a:effectRef idx="0">
+            <a:schemeClr val="accent1"/>
+          </a:effectRef>
+          <a:fontRef idx="minor">
+            <a:schemeClr val="lt1"/>
+          </a:fontRef>
+        </p:style>
+        <p:txBody>
+          <a:bodyPr lIns="0" tIns="0" rIns="0" bIns="0" rtlCol="0" anchor="ctr"/>
+          <a:lstStyle/>
+          <a:p>
+            <a:pPr algn="ctr"/>
+            <a:r>
+              <a:rPr lang="en-CA" sz="700" dirty="0"/>
+              <a:t>comm</a:t>
+            </a:r>
+          </a:p>
+        </p:txBody>
+      </p:sp>
+      <p:sp>
+        <p:nvSpPr>
+          <p:cNvPr id="22" name="Oval 21">
+            <a:extLst>
+              <a:ext uri="{FF2B5EF4-FFF2-40B4-BE49-F238E27FC236}">
+                <a16:creationId xmlns:a16="http://schemas.microsoft.com/office/drawing/2014/main" id="{42EE4598-D7BF-464B-AF18-6DCBB4CA7821}"/>
+              </a:ext>
+            </a:extLst>
+          </p:cNvPr>
+          <p:cNvSpPr/>
+          <p:nvPr/>
+        </p:nvSpPr>
+        <p:spPr>
+          <a:xfrm>
+            <a:off x="10134981" y="2215270"/>
+            <a:ext cx="329555" cy="343474"/>
+          </a:xfrm>
+          <a:prstGeom prst="ellipse">
+            <a:avLst/>
+          </a:prstGeom>
+        </p:spPr>
+        <p:style>
+          <a:lnRef idx="2">
+            <a:schemeClr val="accent1">
+              <a:shade val="50000"/>
+            </a:schemeClr>
+          </a:lnRef>
+          <a:fillRef idx="1">
+            <a:schemeClr val="accent1"/>
+          </a:fillRef>
+          <a:effectRef idx="0">
+            <a:schemeClr val="accent1"/>
+          </a:effectRef>
+          <a:fontRef idx="minor">
+            <a:schemeClr val="lt1"/>
+          </a:fontRef>
+        </p:style>
+        <p:txBody>
+          <a:bodyPr lIns="0" tIns="0" rIns="0" bIns="0" rtlCol="0" anchor="ctr"/>
+          <a:lstStyle/>
+          <a:p>
+            <a:pPr algn="ctr"/>
+            <a:r>
+              <a:rPr lang="en-CA" sz="700" dirty="0"/>
+              <a:t>comm</a:t>
+            </a:r>
+          </a:p>
+        </p:txBody>
+      </p:sp>
+      <p:sp>
+        <p:nvSpPr>
+          <p:cNvPr id="23" name="Oval 22">
+            <a:extLst>
+              <a:ext uri="{FF2B5EF4-FFF2-40B4-BE49-F238E27FC236}">
+                <a16:creationId xmlns:a16="http://schemas.microsoft.com/office/drawing/2014/main" id="{5F187EAB-5FB4-412F-9779-682FAF85896E}"/>
+              </a:ext>
+            </a:extLst>
+          </p:cNvPr>
+          <p:cNvSpPr/>
+          <p:nvPr/>
+        </p:nvSpPr>
+        <p:spPr>
+          <a:xfrm>
+            <a:off x="10872225" y="2215270"/>
+            <a:ext cx="329555" cy="343474"/>
+          </a:xfrm>
+          <a:prstGeom prst="ellipse">
+            <a:avLst/>
+          </a:prstGeom>
+        </p:spPr>
+        <p:style>
+          <a:lnRef idx="2">
+            <a:schemeClr val="accent1">
+              <a:shade val="50000"/>
+            </a:schemeClr>
+          </a:lnRef>
+          <a:fillRef idx="1">
+            <a:schemeClr val="accent1"/>
+          </a:fillRef>
+          <a:effectRef idx="0">
+            <a:schemeClr val="accent1"/>
+          </a:effectRef>
+          <a:fontRef idx="minor">
+            <a:schemeClr val="lt1"/>
+          </a:fontRef>
+        </p:style>
+        <p:txBody>
+          <a:bodyPr lIns="0" tIns="0" rIns="0" bIns="0" rtlCol="0" anchor="ctr"/>
+          <a:lstStyle/>
+          <a:p>
+            <a:pPr algn="ctr"/>
+            <a:r>
+              <a:rPr lang="en-CA" sz="700" dirty="0"/>
+              <a:t>comm</a:t>
+            </a:r>
+          </a:p>
+        </p:txBody>
+      </p:sp>
+      <p:sp>
+        <p:nvSpPr>
+          <p:cNvPr id="25" name="Oval 24">
+            <a:extLst>
+              <a:ext uri="{FF2B5EF4-FFF2-40B4-BE49-F238E27FC236}">
+                <a16:creationId xmlns:a16="http://schemas.microsoft.com/office/drawing/2014/main" id="{ADA29D36-FBBE-48EE-994D-C9DF322E204F}"/>
+              </a:ext>
+            </a:extLst>
+          </p:cNvPr>
+          <p:cNvSpPr/>
+          <p:nvPr/>
+        </p:nvSpPr>
+        <p:spPr>
+          <a:xfrm>
+            <a:off x="3451278" y="3462634"/>
+            <a:ext cx="329555" cy="343474"/>
+          </a:xfrm>
+          <a:prstGeom prst="ellipse">
+            <a:avLst/>
+          </a:prstGeom>
+          <a:solidFill>
+            <a:srgbClr val="FFC000"/>
+          </a:solidFill>
+          <a:ln>
+            <a:solidFill>
+              <a:schemeClr val="accent4">
+                <a:lumMod val="75000"/>
+              </a:schemeClr>
+            </a:solidFill>
+          </a:ln>
+        </p:spPr>
+        <p:style>
+          <a:lnRef idx="2">
+            <a:schemeClr val="accent1">
+              <a:shade val="50000"/>
+            </a:schemeClr>
+          </a:lnRef>
+          <a:fillRef idx="1">
+            <a:schemeClr val="accent1"/>
+          </a:fillRef>
+          <a:effectRef idx="0">
+            <a:schemeClr val="accent1"/>
+          </a:effectRef>
+          <a:fontRef idx="minor">
+            <a:schemeClr val="lt1"/>
+          </a:fontRef>
+        </p:style>
+        <p:txBody>
+          <a:bodyPr lIns="0" tIns="0" rIns="0" bIns="0" rtlCol="0" anchor="ctr"/>
+          <a:lstStyle/>
+          <a:p>
+            <a:pPr algn="ctr"/>
+            <a:r>
+              <a:rPr lang="en-CA" sz="700" dirty="0"/>
+              <a:t>comm</a:t>
+            </a:r>
+          </a:p>
+        </p:txBody>
+      </p:sp>
+      <p:sp>
+        <p:nvSpPr>
+          <p:cNvPr id="26" name="Oval 25">
+            <a:extLst>
+              <a:ext uri="{FF2B5EF4-FFF2-40B4-BE49-F238E27FC236}">
+                <a16:creationId xmlns:a16="http://schemas.microsoft.com/office/drawing/2014/main" id="{C3A2CC32-9E36-466F-8E39-43B49C8784E4}"/>
+              </a:ext>
+            </a:extLst>
+          </p:cNvPr>
+          <p:cNvSpPr/>
+          <p:nvPr/>
+        </p:nvSpPr>
+        <p:spPr>
+          <a:xfrm>
+            <a:off x="4173979" y="3447543"/>
+            <a:ext cx="329555" cy="343474"/>
+          </a:xfrm>
+          <a:prstGeom prst="ellipse">
+            <a:avLst/>
+          </a:prstGeom>
+          <a:solidFill>
+            <a:srgbClr val="FFC000"/>
+          </a:solidFill>
+          <a:ln>
+            <a:solidFill>
+              <a:schemeClr val="accent4">
+                <a:lumMod val="75000"/>
+              </a:schemeClr>
+            </a:solidFill>
+          </a:ln>
+        </p:spPr>
+        <p:style>
+          <a:lnRef idx="2">
+            <a:schemeClr val="accent1">
+              <a:shade val="50000"/>
+            </a:schemeClr>
+          </a:lnRef>
+          <a:fillRef idx="1">
+            <a:schemeClr val="accent1"/>
+          </a:fillRef>
+          <a:effectRef idx="0">
+            <a:schemeClr val="accent1"/>
+          </a:effectRef>
+          <a:fontRef idx="minor">
+            <a:schemeClr val="lt1"/>
+          </a:fontRef>
+        </p:style>
+        <p:txBody>
+          <a:bodyPr lIns="0" tIns="0" rIns="0" bIns="0" rtlCol="0" anchor="ctr"/>
+          <a:lstStyle/>
+          <a:p>
+            <a:pPr algn="ctr"/>
+            <a:r>
+              <a:rPr lang="en-CA" sz="700" dirty="0"/>
+              <a:t>comm</a:t>
+            </a:r>
+          </a:p>
+        </p:txBody>
+      </p:sp>
+      <p:sp>
+        <p:nvSpPr>
+          <p:cNvPr id="32" name="Oval 31">
+            <a:extLst>
+              <a:ext uri="{FF2B5EF4-FFF2-40B4-BE49-F238E27FC236}">
+                <a16:creationId xmlns:a16="http://schemas.microsoft.com/office/drawing/2014/main" id="{F5C7DF70-952C-45C5-BEA1-0C2CA9E2A6FD}"/>
+              </a:ext>
+            </a:extLst>
+          </p:cNvPr>
+          <p:cNvSpPr/>
+          <p:nvPr/>
+        </p:nvSpPr>
+        <p:spPr>
+          <a:xfrm>
+            <a:off x="4993721" y="3429000"/>
+            <a:ext cx="329555" cy="343474"/>
+          </a:xfrm>
+          <a:prstGeom prst="ellipse">
+            <a:avLst/>
+          </a:prstGeom>
+          <a:solidFill>
+            <a:srgbClr val="FFC000"/>
+          </a:solidFill>
+          <a:ln>
+            <a:solidFill>
+              <a:schemeClr val="accent4">
+                <a:lumMod val="75000"/>
+              </a:schemeClr>
+            </a:solidFill>
+          </a:ln>
+        </p:spPr>
+        <p:style>
+          <a:lnRef idx="2">
+            <a:schemeClr val="accent1">
+              <a:shade val="50000"/>
+            </a:schemeClr>
+          </a:lnRef>
+          <a:fillRef idx="1">
+            <a:schemeClr val="accent1"/>
+          </a:fillRef>
+          <a:effectRef idx="0">
+            <a:schemeClr val="accent1"/>
+          </a:effectRef>
+          <a:fontRef idx="minor">
+            <a:schemeClr val="lt1"/>
+          </a:fontRef>
+        </p:style>
+        <p:txBody>
+          <a:bodyPr lIns="0" tIns="0" rIns="0" bIns="0" rtlCol="0" anchor="ctr"/>
+          <a:lstStyle/>
+          <a:p>
+            <a:pPr algn="ctr"/>
+            <a:r>
+              <a:rPr lang="en-CA" sz="700" dirty="0"/>
+              <a:t>comm</a:t>
+            </a:r>
+          </a:p>
+        </p:txBody>
+      </p:sp>
+      <p:sp>
+        <p:nvSpPr>
+          <p:cNvPr id="33" name="Oval 32">
+            <a:extLst>
+              <a:ext uri="{FF2B5EF4-FFF2-40B4-BE49-F238E27FC236}">
+                <a16:creationId xmlns:a16="http://schemas.microsoft.com/office/drawing/2014/main" id="{98240E4A-550C-484F-A2CC-96BE721ACAAE}"/>
+              </a:ext>
+            </a:extLst>
+          </p:cNvPr>
+          <p:cNvSpPr/>
+          <p:nvPr/>
+        </p:nvSpPr>
+        <p:spPr>
+          <a:xfrm>
+            <a:off x="5726103" y="3429000"/>
+            <a:ext cx="329555" cy="343474"/>
+          </a:xfrm>
+          <a:prstGeom prst="ellipse">
+            <a:avLst/>
+          </a:prstGeom>
+          <a:solidFill>
+            <a:srgbClr val="FFC000"/>
+          </a:solidFill>
+          <a:ln>
+            <a:solidFill>
+              <a:schemeClr val="accent4">
+                <a:lumMod val="75000"/>
+              </a:schemeClr>
+            </a:solidFill>
+          </a:ln>
+        </p:spPr>
+        <p:style>
+          <a:lnRef idx="2">
+            <a:schemeClr val="accent1">
+              <a:shade val="50000"/>
+            </a:schemeClr>
+          </a:lnRef>
+          <a:fillRef idx="1">
+            <a:schemeClr val="accent1"/>
+          </a:fillRef>
+          <a:effectRef idx="0">
+            <a:schemeClr val="accent1"/>
+          </a:effectRef>
+          <a:fontRef idx="minor">
+            <a:schemeClr val="lt1"/>
+          </a:fontRef>
+        </p:style>
+        <p:txBody>
+          <a:bodyPr lIns="0" tIns="0" rIns="0" bIns="0" rtlCol="0" anchor="ctr"/>
+          <a:lstStyle/>
+          <a:p>
+            <a:pPr algn="ctr"/>
+            <a:r>
+              <a:rPr lang="en-CA" sz="700" dirty="0"/>
+              <a:t>comm</a:t>
+            </a:r>
+          </a:p>
+        </p:txBody>
+      </p:sp>
+      <p:sp>
+        <p:nvSpPr>
+          <p:cNvPr id="34" name="Oval 33">
+            <a:extLst>
+              <a:ext uri="{FF2B5EF4-FFF2-40B4-BE49-F238E27FC236}">
+                <a16:creationId xmlns:a16="http://schemas.microsoft.com/office/drawing/2014/main" id="{E4406D0E-59E7-4E82-AFF6-D222BE272BE8}"/>
+              </a:ext>
+            </a:extLst>
+          </p:cNvPr>
+          <p:cNvSpPr/>
+          <p:nvPr/>
+        </p:nvSpPr>
+        <p:spPr>
+          <a:xfrm>
+            <a:off x="6458485" y="3429000"/>
+            <a:ext cx="329555" cy="343474"/>
+          </a:xfrm>
+          <a:prstGeom prst="ellipse">
+            <a:avLst/>
+          </a:prstGeom>
+          <a:solidFill>
+            <a:srgbClr val="FFC000"/>
+          </a:solidFill>
+          <a:ln>
+            <a:solidFill>
+              <a:schemeClr val="accent4">
+                <a:lumMod val="75000"/>
+              </a:schemeClr>
+            </a:solidFill>
+          </a:ln>
+        </p:spPr>
+        <p:style>
+          <a:lnRef idx="2">
+            <a:schemeClr val="accent1">
+              <a:shade val="50000"/>
+            </a:schemeClr>
+          </a:lnRef>
+          <a:fillRef idx="1">
+            <a:schemeClr val="accent1"/>
+          </a:fillRef>
+          <a:effectRef idx="0">
+            <a:schemeClr val="accent1"/>
+          </a:effectRef>
+          <a:fontRef idx="minor">
+            <a:schemeClr val="lt1"/>
+          </a:fontRef>
+        </p:style>
+        <p:txBody>
+          <a:bodyPr lIns="0" tIns="0" rIns="0" bIns="0" rtlCol="0" anchor="ctr"/>
+          <a:lstStyle/>
+          <a:p>
+            <a:pPr algn="ctr"/>
+            <a:r>
+              <a:rPr lang="en-CA" sz="700" dirty="0"/>
+              <a:t>comm</a:t>
+            </a:r>
+          </a:p>
+        </p:txBody>
+      </p:sp>
+      <p:sp>
+        <p:nvSpPr>
+          <p:cNvPr id="35" name="Oval 34">
+            <a:extLst>
+              <a:ext uri="{FF2B5EF4-FFF2-40B4-BE49-F238E27FC236}">
+                <a16:creationId xmlns:a16="http://schemas.microsoft.com/office/drawing/2014/main" id="{86B06550-A18C-4845-B171-BA7BA6D103AA}"/>
+              </a:ext>
+            </a:extLst>
+          </p:cNvPr>
+          <p:cNvSpPr/>
+          <p:nvPr/>
+        </p:nvSpPr>
+        <p:spPr>
+          <a:xfrm>
+            <a:off x="7190867" y="3429000"/>
+            <a:ext cx="329555" cy="343474"/>
+          </a:xfrm>
+          <a:prstGeom prst="ellipse">
+            <a:avLst/>
+          </a:prstGeom>
+          <a:solidFill>
+            <a:srgbClr val="FFC000"/>
+          </a:solidFill>
+          <a:ln>
+            <a:solidFill>
+              <a:schemeClr val="accent4">
+                <a:lumMod val="75000"/>
+              </a:schemeClr>
+            </a:solidFill>
+          </a:ln>
+        </p:spPr>
+        <p:style>
+          <a:lnRef idx="2">
+            <a:schemeClr val="accent1">
+              <a:shade val="50000"/>
+            </a:schemeClr>
+          </a:lnRef>
+          <a:fillRef idx="1">
+            <a:schemeClr val="accent1"/>
+          </a:fillRef>
+          <a:effectRef idx="0">
+            <a:schemeClr val="accent1"/>
+          </a:effectRef>
+          <a:fontRef idx="minor">
+            <a:schemeClr val="lt1"/>
+          </a:fontRef>
+        </p:style>
+        <p:txBody>
+          <a:bodyPr lIns="0" tIns="0" rIns="0" bIns="0" rtlCol="0" anchor="ctr"/>
+          <a:lstStyle/>
+          <a:p>
+            <a:pPr algn="ctr"/>
+            <a:r>
+              <a:rPr lang="en-CA" sz="700" dirty="0"/>
+              <a:t>comm</a:t>
+            </a:r>
+          </a:p>
+        </p:txBody>
+      </p:sp>
+      <p:sp>
+        <p:nvSpPr>
+          <p:cNvPr id="36" name="Oval 35">
+            <a:extLst>
+              <a:ext uri="{FF2B5EF4-FFF2-40B4-BE49-F238E27FC236}">
+                <a16:creationId xmlns:a16="http://schemas.microsoft.com/office/drawing/2014/main" id="{859A7A32-31A9-4A40-87EA-1A1AB98BE36A}"/>
+              </a:ext>
+            </a:extLst>
+          </p:cNvPr>
+          <p:cNvSpPr/>
+          <p:nvPr/>
+        </p:nvSpPr>
+        <p:spPr>
+          <a:xfrm>
+            <a:off x="7923249" y="3429000"/>
+            <a:ext cx="329555" cy="343474"/>
+          </a:xfrm>
+          <a:prstGeom prst="ellipse">
+            <a:avLst/>
+          </a:prstGeom>
+          <a:solidFill>
+            <a:srgbClr val="FFC000"/>
+          </a:solidFill>
+          <a:ln>
+            <a:solidFill>
+              <a:schemeClr val="accent4">
+                <a:lumMod val="75000"/>
+              </a:schemeClr>
+            </a:solidFill>
+          </a:ln>
+        </p:spPr>
+        <p:style>
+          <a:lnRef idx="2">
+            <a:schemeClr val="accent1">
+              <a:shade val="50000"/>
+            </a:schemeClr>
+          </a:lnRef>
+          <a:fillRef idx="1">
+            <a:schemeClr val="accent1"/>
+          </a:fillRef>
+          <a:effectRef idx="0">
+            <a:schemeClr val="accent1"/>
+          </a:effectRef>
+          <a:fontRef idx="minor">
+            <a:schemeClr val="lt1"/>
+          </a:fontRef>
+        </p:style>
+        <p:txBody>
+          <a:bodyPr lIns="0" tIns="0" rIns="0" bIns="0" rtlCol="0" anchor="ctr"/>
+          <a:lstStyle/>
+          <a:p>
+            <a:pPr algn="ctr"/>
+            <a:r>
+              <a:rPr lang="en-CA" sz="700" dirty="0"/>
+              <a:t>comm</a:t>
+            </a:r>
+          </a:p>
+        </p:txBody>
+      </p:sp>
+      <p:cxnSp>
+        <p:nvCxnSpPr>
+          <p:cNvPr id="37" name="Straight Connector 36">
+            <a:extLst>
+              <a:ext uri="{FF2B5EF4-FFF2-40B4-BE49-F238E27FC236}">
+                <a16:creationId xmlns:a16="http://schemas.microsoft.com/office/drawing/2014/main" id="{60769AB4-11C7-4DE3-B3E6-E38DFDB0B6F9}"/>
+              </a:ext>
+            </a:extLst>
+          </p:cNvPr>
+          <p:cNvCxnSpPr>
+            <a:cxnSpLocks/>
+          </p:cNvCxnSpPr>
+          <p:nvPr/>
+        </p:nvCxnSpPr>
+        <p:spPr>
+          <a:xfrm>
+            <a:off x="5273105" y="4689217"/>
+            <a:ext cx="5170318" cy="0"/>
+          </a:xfrm>
+          <a:prstGeom prst="line">
+            <a:avLst/>
+          </a:prstGeom>
+          <a:ln w="66675">
+            <a:solidFill>
+              <a:srgbClr val="FF0000"/>
+            </a:solidFill>
+          </a:ln>
+        </p:spPr>
+        <p:style>
+          <a:lnRef idx="1">
+            <a:schemeClr val="accent1"/>
+          </a:lnRef>
+          <a:fillRef idx="0">
+            <a:schemeClr val="accent1"/>
+          </a:fillRef>
+          <a:effectRef idx="0">
+            <a:schemeClr val="accent1"/>
+          </a:effectRef>
+          <a:fontRef idx="minor">
+            <a:schemeClr val="tx1"/>
+          </a:fontRef>
+        </p:style>
+      </p:cxnSp>
+      <p:sp>
+        <p:nvSpPr>
+          <p:cNvPr id="48" name="Oval 47">
+            <a:extLst>
+              <a:ext uri="{FF2B5EF4-FFF2-40B4-BE49-F238E27FC236}">
+                <a16:creationId xmlns:a16="http://schemas.microsoft.com/office/drawing/2014/main" id="{E948C875-9FEF-4C50-B2B3-DAC952E8545F}"/>
+              </a:ext>
+            </a:extLst>
+          </p:cNvPr>
+          <p:cNvSpPr/>
+          <p:nvPr/>
+        </p:nvSpPr>
+        <p:spPr>
+          <a:xfrm>
+            <a:off x="5217656" y="4471290"/>
+            <a:ext cx="329555" cy="343474"/>
+          </a:xfrm>
+          <a:prstGeom prst="ellipse">
+            <a:avLst/>
+          </a:prstGeom>
+          <a:solidFill>
+            <a:srgbClr val="FF0000"/>
+          </a:solidFill>
+          <a:ln>
+            <a:solidFill>
+              <a:srgbClr val="C00000"/>
+            </a:solidFill>
+          </a:ln>
+        </p:spPr>
+        <p:style>
+          <a:lnRef idx="2">
+            <a:schemeClr val="accent1">
+              <a:shade val="50000"/>
+            </a:schemeClr>
+          </a:lnRef>
+          <a:fillRef idx="1">
+            <a:schemeClr val="accent1"/>
+          </a:fillRef>
+          <a:effectRef idx="0">
+            <a:schemeClr val="accent1"/>
+          </a:effectRef>
+          <a:fontRef idx="minor">
+            <a:schemeClr val="lt1"/>
+          </a:fontRef>
+        </p:style>
+        <p:txBody>
+          <a:bodyPr lIns="0" tIns="0" rIns="0" bIns="0" rtlCol="0" anchor="ctr"/>
+          <a:lstStyle/>
+          <a:p>
+            <a:pPr algn="ctr"/>
+            <a:r>
+              <a:rPr lang="en-CA" sz="700" dirty="0"/>
+              <a:t>comm</a:t>
+            </a:r>
+          </a:p>
+        </p:txBody>
+      </p:sp>
+      <p:sp>
+        <p:nvSpPr>
+          <p:cNvPr id="49" name="Oval 48">
+            <a:extLst>
+              <a:ext uri="{FF2B5EF4-FFF2-40B4-BE49-F238E27FC236}">
+                <a16:creationId xmlns:a16="http://schemas.microsoft.com/office/drawing/2014/main" id="{D3360D8A-F189-4588-B76E-93D466B52EB1}"/>
+              </a:ext>
+            </a:extLst>
+          </p:cNvPr>
+          <p:cNvSpPr/>
+          <p:nvPr/>
+        </p:nvSpPr>
+        <p:spPr>
+          <a:xfrm>
+            <a:off x="5890880" y="4498817"/>
+            <a:ext cx="329555" cy="343474"/>
+          </a:xfrm>
+          <a:prstGeom prst="ellipse">
+            <a:avLst/>
+          </a:prstGeom>
+          <a:solidFill>
+            <a:srgbClr val="FF0000"/>
+          </a:solidFill>
+          <a:ln>
+            <a:solidFill>
+              <a:srgbClr val="C00000"/>
+            </a:solidFill>
+          </a:ln>
+        </p:spPr>
+        <p:style>
+          <a:lnRef idx="2">
+            <a:schemeClr val="accent1">
+              <a:shade val="50000"/>
+            </a:schemeClr>
+          </a:lnRef>
+          <a:fillRef idx="1">
+            <a:schemeClr val="accent1"/>
+          </a:fillRef>
+          <a:effectRef idx="0">
+            <a:schemeClr val="accent1"/>
+          </a:effectRef>
+          <a:fontRef idx="minor">
+            <a:schemeClr val="lt1"/>
+          </a:fontRef>
+        </p:style>
+        <p:txBody>
+          <a:bodyPr lIns="0" tIns="0" rIns="0" bIns="0" rtlCol="0" anchor="ctr"/>
+          <a:lstStyle/>
+          <a:p>
+            <a:pPr algn="ctr"/>
+            <a:r>
+              <a:rPr lang="en-CA" sz="700" dirty="0"/>
+              <a:t>comm</a:t>
+            </a:r>
+          </a:p>
+        </p:txBody>
+      </p:sp>
+      <p:sp>
+        <p:nvSpPr>
+          <p:cNvPr id="50" name="Oval 49">
+            <a:extLst>
+              <a:ext uri="{FF2B5EF4-FFF2-40B4-BE49-F238E27FC236}">
+                <a16:creationId xmlns:a16="http://schemas.microsoft.com/office/drawing/2014/main" id="{89BC8ED7-486E-4EBF-8FF9-D6A517258760}"/>
+              </a:ext>
+            </a:extLst>
+          </p:cNvPr>
+          <p:cNvSpPr/>
+          <p:nvPr/>
+        </p:nvSpPr>
+        <p:spPr>
+          <a:xfrm>
+            <a:off x="6608676" y="4519325"/>
+            <a:ext cx="329555" cy="343474"/>
+          </a:xfrm>
+          <a:prstGeom prst="ellipse">
+            <a:avLst/>
+          </a:prstGeom>
+          <a:solidFill>
+            <a:srgbClr val="FF0000"/>
+          </a:solidFill>
+          <a:ln>
+            <a:solidFill>
+              <a:srgbClr val="C00000"/>
+            </a:solidFill>
+          </a:ln>
+        </p:spPr>
+        <p:style>
+          <a:lnRef idx="2">
+            <a:schemeClr val="accent1">
+              <a:shade val="50000"/>
+            </a:schemeClr>
+          </a:lnRef>
+          <a:fillRef idx="1">
+            <a:schemeClr val="accent1"/>
+          </a:fillRef>
+          <a:effectRef idx="0">
+            <a:schemeClr val="accent1"/>
+          </a:effectRef>
+          <a:fontRef idx="minor">
+            <a:schemeClr val="lt1"/>
+          </a:fontRef>
+        </p:style>
+        <p:txBody>
+          <a:bodyPr lIns="0" tIns="0" rIns="0" bIns="0" rtlCol="0" anchor="ctr"/>
+          <a:lstStyle/>
+          <a:p>
+            <a:pPr algn="ctr"/>
+            <a:r>
+              <a:rPr lang="en-CA" sz="700" dirty="0"/>
+              <a:t>comm</a:t>
+            </a:r>
+          </a:p>
+        </p:txBody>
+      </p:sp>
+      <p:sp>
+        <p:nvSpPr>
+          <p:cNvPr id="51" name="Oval 50">
+            <a:extLst>
+              <a:ext uri="{FF2B5EF4-FFF2-40B4-BE49-F238E27FC236}">
+                <a16:creationId xmlns:a16="http://schemas.microsoft.com/office/drawing/2014/main" id="{BE271330-4361-4CED-A1F9-74198AC65924}"/>
+              </a:ext>
+            </a:extLst>
+          </p:cNvPr>
+          <p:cNvSpPr/>
+          <p:nvPr/>
+        </p:nvSpPr>
+        <p:spPr>
+          <a:xfrm>
+            <a:off x="7326472" y="4521265"/>
+            <a:ext cx="329555" cy="343474"/>
+          </a:xfrm>
+          <a:prstGeom prst="ellipse">
+            <a:avLst/>
+          </a:prstGeom>
+          <a:solidFill>
+            <a:srgbClr val="FF0000"/>
+          </a:solidFill>
+          <a:ln>
+            <a:solidFill>
+              <a:srgbClr val="C00000"/>
+            </a:solidFill>
+          </a:ln>
+        </p:spPr>
+        <p:style>
+          <a:lnRef idx="2">
+            <a:schemeClr val="accent1">
+              <a:shade val="50000"/>
+            </a:schemeClr>
+          </a:lnRef>
+          <a:fillRef idx="1">
+            <a:schemeClr val="accent1"/>
+          </a:fillRef>
+          <a:effectRef idx="0">
+            <a:schemeClr val="accent1"/>
+          </a:effectRef>
+          <a:fontRef idx="minor">
+            <a:schemeClr val="lt1"/>
+          </a:fontRef>
+        </p:style>
+        <p:txBody>
+          <a:bodyPr lIns="0" tIns="0" rIns="0" bIns="0" rtlCol="0" anchor="ctr"/>
+          <a:lstStyle/>
+          <a:p>
+            <a:pPr algn="ctr"/>
+            <a:r>
+              <a:rPr lang="en-CA" sz="700" dirty="0"/>
+              <a:t>comm</a:t>
+            </a:r>
+          </a:p>
+        </p:txBody>
+      </p:sp>
+      <p:sp>
+        <p:nvSpPr>
+          <p:cNvPr id="52" name="Oval 51">
+            <a:extLst>
+              <a:ext uri="{FF2B5EF4-FFF2-40B4-BE49-F238E27FC236}">
+                <a16:creationId xmlns:a16="http://schemas.microsoft.com/office/drawing/2014/main" id="{44C8CDE1-F482-4B89-8A73-117E673472FF}"/>
+              </a:ext>
+            </a:extLst>
+          </p:cNvPr>
+          <p:cNvSpPr/>
+          <p:nvPr/>
+        </p:nvSpPr>
+        <p:spPr>
+          <a:xfrm>
+            <a:off x="8044268" y="4518563"/>
+            <a:ext cx="329555" cy="343474"/>
+          </a:xfrm>
+          <a:prstGeom prst="ellipse">
+            <a:avLst/>
+          </a:prstGeom>
+          <a:solidFill>
+            <a:srgbClr val="FF0000"/>
+          </a:solidFill>
+          <a:ln>
+            <a:solidFill>
+              <a:srgbClr val="C00000"/>
+            </a:solidFill>
+          </a:ln>
+        </p:spPr>
+        <p:style>
+          <a:lnRef idx="2">
+            <a:schemeClr val="accent1">
+              <a:shade val="50000"/>
+            </a:schemeClr>
+          </a:lnRef>
+          <a:fillRef idx="1">
+            <a:schemeClr val="accent1"/>
+          </a:fillRef>
+          <a:effectRef idx="0">
+            <a:schemeClr val="accent1"/>
+          </a:effectRef>
+          <a:fontRef idx="minor">
+            <a:schemeClr val="lt1"/>
+          </a:fontRef>
+        </p:style>
+        <p:txBody>
+          <a:bodyPr lIns="0" tIns="0" rIns="0" bIns="0" rtlCol="0" anchor="ctr"/>
+          <a:lstStyle/>
+          <a:p>
+            <a:pPr algn="ctr"/>
+            <a:r>
+              <a:rPr lang="en-CA" sz="700" dirty="0"/>
+              <a:t>comm</a:t>
+            </a:r>
+          </a:p>
+        </p:txBody>
+      </p:sp>
+      <p:sp>
+        <p:nvSpPr>
+          <p:cNvPr id="53" name="Oval 52">
+            <a:extLst>
+              <a:ext uri="{FF2B5EF4-FFF2-40B4-BE49-F238E27FC236}">
+                <a16:creationId xmlns:a16="http://schemas.microsoft.com/office/drawing/2014/main" id="{010A9EA5-316D-401D-9F4F-179A67C75274}"/>
+              </a:ext>
+            </a:extLst>
+          </p:cNvPr>
+          <p:cNvSpPr/>
+          <p:nvPr/>
+        </p:nvSpPr>
+        <p:spPr>
+          <a:xfrm>
+            <a:off x="8762064" y="4515861"/>
+            <a:ext cx="329555" cy="343474"/>
+          </a:xfrm>
+          <a:prstGeom prst="ellipse">
+            <a:avLst/>
+          </a:prstGeom>
+          <a:solidFill>
+            <a:srgbClr val="FF0000"/>
+          </a:solidFill>
+          <a:ln>
+            <a:solidFill>
+              <a:srgbClr val="C00000"/>
+            </a:solidFill>
+          </a:ln>
+        </p:spPr>
+        <p:style>
+          <a:lnRef idx="2">
+            <a:schemeClr val="accent1">
+              <a:shade val="50000"/>
+            </a:schemeClr>
+          </a:lnRef>
+          <a:fillRef idx="1">
+            <a:schemeClr val="accent1"/>
+          </a:fillRef>
+          <a:effectRef idx="0">
+            <a:schemeClr val="accent1"/>
+          </a:effectRef>
+          <a:fontRef idx="minor">
+            <a:schemeClr val="lt1"/>
+          </a:fontRef>
+        </p:style>
+        <p:txBody>
+          <a:bodyPr lIns="0" tIns="0" rIns="0" bIns="0" rtlCol="0" anchor="ctr"/>
+          <a:lstStyle/>
+          <a:p>
+            <a:pPr algn="ctr"/>
+            <a:r>
+              <a:rPr lang="en-CA" sz="700" dirty="0"/>
+              <a:t>comm</a:t>
+            </a:r>
+          </a:p>
+        </p:txBody>
+      </p:sp>
+      <p:sp>
+        <p:nvSpPr>
+          <p:cNvPr id="54" name="Oval 53">
+            <a:extLst>
+              <a:ext uri="{FF2B5EF4-FFF2-40B4-BE49-F238E27FC236}">
+                <a16:creationId xmlns:a16="http://schemas.microsoft.com/office/drawing/2014/main" id="{A018A8FE-1E92-4E5C-973B-7905779D9649}"/>
+              </a:ext>
+            </a:extLst>
+          </p:cNvPr>
+          <p:cNvSpPr/>
+          <p:nvPr/>
+        </p:nvSpPr>
+        <p:spPr>
+          <a:xfrm>
+            <a:off x="9479860" y="4513159"/>
+            <a:ext cx="329555" cy="343474"/>
+          </a:xfrm>
+          <a:prstGeom prst="ellipse">
+            <a:avLst/>
+          </a:prstGeom>
+          <a:solidFill>
+            <a:srgbClr val="FF0000"/>
+          </a:solidFill>
+          <a:ln>
+            <a:solidFill>
+              <a:srgbClr val="C00000"/>
+            </a:solidFill>
+          </a:ln>
+        </p:spPr>
+        <p:style>
+          <a:lnRef idx="2">
+            <a:schemeClr val="accent1">
+              <a:shade val="50000"/>
+            </a:schemeClr>
+          </a:lnRef>
+          <a:fillRef idx="1">
+            <a:schemeClr val="accent1"/>
+          </a:fillRef>
+          <a:effectRef idx="0">
+            <a:schemeClr val="accent1"/>
+          </a:effectRef>
+          <a:fontRef idx="minor">
+            <a:schemeClr val="lt1"/>
+          </a:fontRef>
+        </p:style>
+        <p:txBody>
+          <a:bodyPr lIns="0" tIns="0" rIns="0" bIns="0" rtlCol="0" anchor="ctr"/>
+          <a:lstStyle/>
+          <a:p>
+            <a:pPr algn="ctr"/>
+            <a:r>
+              <a:rPr lang="en-CA" sz="700" dirty="0"/>
+              <a:t>comm</a:t>
+            </a:r>
+          </a:p>
+        </p:txBody>
+      </p:sp>
+      <p:sp>
+        <p:nvSpPr>
+          <p:cNvPr id="58" name="Oval 57">
+            <a:extLst>
+              <a:ext uri="{FF2B5EF4-FFF2-40B4-BE49-F238E27FC236}">
+                <a16:creationId xmlns:a16="http://schemas.microsoft.com/office/drawing/2014/main" id="{54728E9F-D1DE-43AC-9714-B5652D4D0FA9}"/>
+              </a:ext>
+            </a:extLst>
+          </p:cNvPr>
+          <p:cNvSpPr/>
+          <p:nvPr/>
+        </p:nvSpPr>
+        <p:spPr>
+          <a:xfrm>
+            <a:off x="8567219" y="3429000"/>
+            <a:ext cx="329555" cy="343474"/>
+          </a:xfrm>
+          <a:prstGeom prst="ellipse">
+            <a:avLst/>
+          </a:prstGeom>
+          <a:solidFill>
+            <a:srgbClr val="FFC000"/>
+          </a:solidFill>
+          <a:ln>
+            <a:solidFill>
+              <a:schemeClr val="accent4">
+                <a:lumMod val="75000"/>
+              </a:schemeClr>
+            </a:solidFill>
+          </a:ln>
+        </p:spPr>
+        <p:style>
+          <a:lnRef idx="2">
+            <a:schemeClr val="accent1">
+              <a:shade val="50000"/>
+            </a:schemeClr>
+          </a:lnRef>
+          <a:fillRef idx="1">
+            <a:schemeClr val="accent1"/>
+          </a:fillRef>
+          <a:effectRef idx="0">
+            <a:schemeClr val="accent1"/>
+          </a:effectRef>
+          <a:fontRef idx="minor">
+            <a:schemeClr val="lt1"/>
+          </a:fontRef>
+        </p:style>
+        <p:txBody>
+          <a:bodyPr lIns="0" tIns="0" rIns="0" bIns="0" rtlCol="0" anchor="ctr"/>
+          <a:lstStyle/>
+          <a:p>
+            <a:pPr algn="ctr"/>
+            <a:r>
+              <a:rPr lang="en-CA" sz="700" dirty="0"/>
+              <a:t>comm</a:t>
+            </a:r>
+          </a:p>
+        </p:txBody>
+      </p:sp>
+      <p:sp>
+        <p:nvSpPr>
+          <p:cNvPr id="59" name="TextBox 58">
+            <a:extLst>
+              <a:ext uri="{FF2B5EF4-FFF2-40B4-BE49-F238E27FC236}">
+                <a16:creationId xmlns:a16="http://schemas.microsoft.com/office/drawing/2014/main" id="{B3752F85-B1E0-4197-8A0F-2D5A36076753}"/>
+              </a:ext>
+            </a:extLst>
+          </p:cNvPr>
+          <p:cNvSpPr txBox="1"/>
+          <p:nvPr/>
+        </p:nvSpPr>
+        <p:spPr>
+          <a:xfrm>
+            <a:off x="82242" y="2075553"/>
+            <a:ext cx="1342919" cy="523220"/>
           </a:xfrm>
           <a:prstGeom prst="rect">
             <a:avLst/>
           </a:prstGeom>
-        </p:spPr>
-      </p:pic>
+          <a:noFill/>
+        </p:spPr>
+        <p:txBody>
+          <a:bodyPr wrap="square" rtlCol="0">
+            <a:spAutoFit/>
+          </a:bodyPr>
+          <a:lstStyle/>
+          <a:p>
+            <a:pPr algn="ctr"/>
+            <a:r>
+              <a:rPr lang="en-CA" sz="2800" b="1" dirty="0">
+                <a:solidFill>
+                  <a:schemeClr val="accent1"/>
+                </a:solidFill>
+              </a:rPr>
+              <a:t>Main</a:t>
+            </a:r>
+          </a:p>
+        </p:txBody>
+      </p:sp>
+      <p:sp>
+        <p:nvSpPr>
+          <p:cNvPr id="60" name="TextBox 59">
+            <a:extLst>
+              <a:ext uri="{FF2B5EF4-FFF2-40B4-BE49-F238E27FC236}">
+                <a16:creationId xmlns:a16="http://schemas.microsoft.com/office/drawing/2014/main" id="{55ECDB56-8FA3-40FD-A919-F522ECEFC484}"/>
+              </a:ext>
+            </a:extLst>
+          </p:cNvPr>
+          <p:cNvSpPr txBox="1"/>
+          <p:nvPr/>
+        </p:nvSpPr>
+        <p:spPr>
+          <a:xfrm>
+            <a:off x="1465544" y="3304561"/>
+            <a:ext cx="1664017" cy="523220"/>
+          </a:xfrm>
+          <a:prstGeom prst="rect">
+            <a:avLst/>
+          </a:prstGeom>
+          <a:noFill/>
+        </p:spPr>
+        <p:txBody>
+          <a:bodyPr wrap="square" rtlCol="0">
+            <a:spAutoFit/>
+          </a:bodyPr>
+          <a:lstStyle/>
+          <a:p>
+            <a:pPr algn="ctr"/>
+            <a:r>
+              <a:rPr lang="en-CA" sz="2800" b="1" dirty="0">
+                <a:solidFill>
+                  <a:srgbClr val="FFC000"/>
+                </a:solidFill>
+              </a:rPr>
+              <a:t>Feature1</a:t>
+            </a:r>
+          </a:p>
+        </p:txBody>
+      </p:sp>
+      <p:sp>
+        <p:nvSpPr>
+          <p:cNvPr id="61" name="TextBox 60">
+            <a:extLst>
+              <a:ext uri="{FF2B5EF4-FFF2-40B4-BE49-F238E27FC236}">
+                <a16:creationId xmlns:a16="http://schemas.microsoft.com/office/drawing/2014/main" id="{869FC57D-4532-4587-A878-F8FBA6659692}"/>
+              </a:ext>
+            </a:extLst>
+          </p:cNvPr>
+          <p:cNvSpPr txBox="1"/>
+          <p:nvPr/>
+        </p:nvSpPr>
+        <p:spPr>
+          <a:xfrm>
+            <a:off x="3476308" y="4399660"/>
+            <a:ext cx="1664017" cy="523220"/>
+          </a:xfrm>
+          <a:prstGeom prst="rect">
+            <a:avLst/>
+          </a:prstGeom>
+          <a:noFill/>
+        </p:spPr>
+        <p:txBody>
+          <a:bodyPr wrap="square" rtlCol="0">
+            <a:spAutoFit/>
+          </a:bodyPr>
+          <a:lstStyle/>
+          <a:p>
+            <a:pPr algn="ctr"/>
+            <a:r>
+              <a:rPr lang="en-CA" sz="2800" b="1" dirty="0">
+                <a:solidFill>
+                  <a:srgbClr val="FF0000"/>
+                </a:solidFill>
+              </a:rPr>
+              <a:t>Feature2</a:t>
+            </a:r>
+          </a:p>
+        </p:txBody>
+      </p:sp>
+      <p:sp>
+        <p:nvSpPr>
+          <p:cNvPr id="62" name="TextBox 61">
+            <a:extLst>
+              <a:ext uri="{FF2B5EF4-FFF2-40B4-BE49-F238E27FC236}">
+                <a16:creationId xmlns:a16="http://schemas.microsoft.com/office/drawing/2014/main" id="{1B9B6059-DB7C-4CDF-90A5-AE376115D3E6}"/>
+              </a:ext>
+            </a:extLst>
+          </p:cNvPr>
+          <p:cNvSpPr txBox="1"/>
+          <p:nvPr/>
+        </p:nvSpPr>
+        <p:spPr>
+          <a:xfrm>
+            <a:off x="2577162" y="1310309"/>
+            <a:ext cx="823648" cy="584775"/>
+          </a:xfrm>
+          <a:prstGeom prst="rect">
+            <a:avLst/>
+          </a:prstGeom>
+          <a:noFill/>
+        </p:spPr>
+        <p:txBody>
+          <a:bodyPr wrap="square" rtlCol="0">
+            <a:spAutoFit/>
+          </a:bodyPr>
+          <a:lstStyle/>
+          <a:p>
+            <a:pPr algn="ctr"/>
+            <a:r>
+              <a:rPr lang="en-CA" sz="1600" b="1" dirty="0"/>
+              <a:t>Create branch</a:t>
+            </a:r>
+          </a:p>
+        </p:txBody>
+      </p:sp>
+      <p:cxnSp>
+        <p:nvCxnSpPr>
+          <p:cNvPr id="64" name="Straight Arrow Connector 63">
+            <a:extLst>
+              <a:ext uri="{FF2B5EF4-FFF2-40B4-BE49-F238E27FC236}">
+                <a16:creationId xmlns:a16="http://schemas.microsoft.com/office/drawing/2014/main" id="{D6D94A60-A535-4A84-B0E3-356B9EAD2698}"/>
+              </a:ext>
+            </a:extLst>
+          </p:cNvPr>
+          <p:cNvCxnSpPr>
+            <a:cxnSpLocks/>
+          </p:cNvCxnSpPr>
+          <p:nvPr/>
+        </p:nvCxnSpPr>
+        <p:spPr>
+          <a:xfrm>
+            <a:off x="2988986" y="1849550"/>
+            <a:ext cx="0" cy="485226"/>
+          </a:xfrm>
+          <a:prstGeom prst="straightConnector1">
+            <a:avLst/>
+          </a:prstGeom>
+          <a:ln w="31750">
+            <a:solidFill>
+              <a:schemeClr val="tx1"/>
+            </a:solidFill>
+            <a:tailEnd type="triangle"/>
+          </a:ln>
+        </p:spPr>
+        <p:style>
+          <a:lnRef idx="1">
+            <a:schemeClr val="accent1"/>
+          </a:lnRef>
+          <a:fillRef idx="0">
+            <a:schemeClr val="accent1"/>
+          </a:fillRef>
+          <a:effectRef idx="0">
+            <a:schemeClr val="accent1"/>
+          </a:effectRef>
+          <a:fontRef idx="minor">
+            <a:schemeClr val="tx1"/>
+          </a:fontRef>
+        </p:style>
+      </p:cxnSp>
+      <p:cxnSp>
+        <p:nvCxnSpPr>
+          <p:cNvPr id="73" name="Straight Arrow Connector 72">
+            <a:extLst>
+              <a:ext uri="{FF2B5EF4-FFF2-40B4-BE49-F238E27FC236}">
+                <a16:creationId xmlns:a16="http://schemas.microsoft.com/office/drawing/2014/main" id="{1F280E59-E56E-432A-95B1-060B559B8C4F}"/>
+              </a:ext>
+            </a:extLst>
+          </p:cNvPr>
+          <p:cNvCxnSpPr>
+            <a:cxnSpLocks/>
+          </p:cNvCxnSpPr>
+          <p:nvPr/>
+        </p:nvCxnSpPr>
+        <p:spPr>
+          <a:xfrm>
+            <a:off x="3295941" y="1828541"/>
+            <a:ext cx="1082313" cy="472088"/>
+          </a:xfrm>
+          <a:prstGeom prst="straightConnector1">
+            <a:avLst/>
+          </a:prstGeom>
+          <a:ln w="31750">
+            <a:solidFill>
+              <a:schemeClr val="tx1"/>
+            </a:solidFill>
+            <a:tailEnd type="triangle"/>
+          </a:ln>
+        </p:spPr>
+        <p:style>
+          <a:lnRef idx="1">
+            <a:schemeClr val="accent1"/>
+          </a:lnRef>
+          <a:fillRef idx="0">
+            <a:schemeClr val="accent1"/>
+          </a:fillRef>
+          <a:effectRef idx="0">
+            <a:schemeClr val="accent1"/>
+          </a:effectRef>
+          <a:fontRef idx="minor">
+            <a:schemeClr val="tx1"/>
+          </a:fontRef>
+        </p:style>
+      </p:cxnSp>
+      <p:sp>
+        <p:nvSpPr>
+          <p:cNvPr id="76" name="TextBox 75">
+            <a:extLst>
+              <a:ext uri="{FF2B5EF4-FFF2-40B4-BE49-F238E27FC236}">
+                <a16:creationId xmlns:a16="http://schemas.microsoft.com/office/drawing/2014/main" id="{41B3E566-8167-46A8-87A0-0AD1EA52D8F3}"/>
+              </a:ext>
+            </a:extLst>
+          </p:cNvPr>
+          <p:cNvSpPr txBox="1"/>
+          <p:nvPr/>
+        </p:nvSpPr>
+        <p:spPr>
+          <a:xfrm>
+            <a:off x="9127138" y="1343016"/>
+            <a:ext cx="823648" cy="584775"/>
+          </a:xfrm>
+          <a:prstGeom prst="rect">
+            <a:avLst/>
+          </a:prstGeom>
+          <a:noFill/>
+        </p:spPr>
+        <p:txBody>
+          <a:bodyPr wrap="square" rtlCol="0">
+            <a:spAutoFit/>
+          </a:bodyPr>
+          <a:lstStyle/>
+          <a:p>
+            <a:pPr algn="ctr"/>
+            <a:r>
+              <a:rPr lang="en-CA" sz="1600" b="1" dirty="0"/>
+              <a:t>Merge branch</a:t>
+            </a:r>
+          </a:p>
+        </p:txBody>
+      </p:sp>
+      <p:cxnSp>
+        <p:nvCxnSpPr>
+          <p:cNvPr id="77" name="Straight Arrow Connector 76">
+            <a:extLst>
+              <a:ext uri="{FF2B5EF4-FFF2-40B4-BE49-F238E27FC236}">
+                <a16:creationId xmlns:a16="http://schemas.microsoft.com/office/drawing/2014/main" id="{8F6989E6-BA53-4D06-B264-9BD3B7517CEE}"/>
+              </a:ext>
+            </a:extLst>
+          </p:cNvPr>
+          <p:cNvCxnSpPr>
+            <a:cxnSpLocks/>
+            <a:stCxn id="76" idx="2"/>
+          </p:cNvCxnSpPr>
+          <p:nvPr/>
+        </p:nvCxnSpPr>
+        <p:spPr>
+          <a:xfrm flipH="1">
+            <a:off x="9534144" y="1927791"/>
+            <a:ext cx="4818" cy="372838"/>
+          </a:xfrm>
+          <a:prstGeom prst="straightConnector1">
+            <a:avLst/>
+          </a:prstGeom>
+          <a:ln w="31750">
+            <a:solidFill>
+              <a:schemeClr val="tx1"/>
+            </a:solidFill>
+            <a:tailEnd type="triangle"/>
+          </a:ln>
+        </p:spPr>
+        <p:style>
+          <a:lnRef idx="1">
+            <a:schemeClr val="accent1"/>
+          </a:lnRef>
+          <a:fillRef idx="0">
+            <a:schemeClr val="accent1"/>
+          </a:fillRef>
+          <a:effectRef idx="0">
+            <a:schemeClr val="accent1"/>
+          </a:effectRef>
+          <a:fontRef idx="minor">
+            <a:schemeClr val="tx1"/>
+          </a:fontRef>
+        </p:style>
+      </p:cxnSp>
     </p:spTree>
     <p:extLst>
       <p:ext uri="{BB962C8B-B14F-4D97-AF65-F5344CB8AC3E}">
-        <p14:creationId xmlns:p14="http://schemas.microsoft.com/office/powerpoint/2010/main" val="1009688993"/>
+        <p14:creationId xmlns:p14="http://schemas.microsoft.com/office/powerpoint/2010/main" val="1682356761"/>
       </p:ext>
     </p:extLst>
   </p:cSld>
@@ -6455,10 +8556,10 @@
       </p:grpSpPr>
       <p:pic>
         <p:nvPicPr>
-          <p:cNvPr id="8" name="Picture 7">
-            <a:extLst>
-              <a:ext uri="{FF2B5EF4-FFF2-40B4-BE49-F238E27FC236}">
-                <a16:creationId xmlns:a16="http://schemas.microsoft.com/office/drawing/2014/main" id="{F729CBEA-E679-4238-9425-261FFE912314}"/>
+          <p:cNvPr id="5" name="Picture 4">
+            <a:extLst>
+              <a:ext uri="{FF2B5EF4-FFF2-40B4-BE49-F238E27FC236}">
+                <a16:creationId xmlns:a16="http://schemas.microsoft.com/office/drawing/2014/main" id="{1E60588B-FB51-4270-85C6-C9F76575D76B}"/>
               </a:ext>
             </a:extLst>
           </p:cNvPr>
@@ -6467,78 +8568,25 @@
           </p:cNvPicPr>
           <p:nvPr/>
         </p:nvPicPr>
-        <p:blipFill>
+        <p:blipFill rotWithShape="1">
           <a:blip r:embed="rId2"/>
-          <a:stretch>
-            <a:fillRect/>
-          </a:stretch>
+          <a:srcRect l="17329" t="44173" r="75078" b="51269"/>
+          <a:stretch/>
         </p:blipFill>
         <p:spPr>
           <a:xfrm>
-            <a:off x="850122" y="0"/>
-            <a:ext cx="10491755" cy="6858000"/>
+            <a:off x="2112774" y="2476264"/>
+            <a:ext cx="2672480" cy="868964"/>
           </a:xfrm>
           <a:prstGeom prst="rect">
             <a:avLst/>
           </a:prstGeom>
         </p:spPr>
       </p:pic>
-      <p:sp>
-        <p:nvSpPr>
-          <p:cNvPr id="9" name="Arrow: Right 8">
-            <a:extLst>
-              <a:ext uri="{FF2B5EF4-FFF2-40B4-BE49-F238E27FC236}">
-                <a16:creationId xmlns:a16="http://schemas.microsoft.com/office/drawing/2014/main" id="{09C4129A-6CC7-4692-AFF6-BD4224084D43}"/>
-              </a:ext>
-            </a:extLst>
-          </p:cNvPr>
-          <p:cNvSpPr/>
-          <p:nvPr/>
-        </p:nvSpPr>
-        <p:spPr>
-          <a:xfrm rot="10800000">
-            <a:off x="2910447" y="3089337"/>
-            <a:ext cx="2536196" cy="784083"/>
-          </a:xfrm>
-          <a:prstGeom prst="rightArrow">
-            <a:avLst/>
-          </a:prstGeom>
-          <a:solidFill>
-            <a:srgbClr val="FF0000"/>
-          </a:solidFill>
-          <a:ln>
-            <a:noFill/>
-          </a:ln>
-        </p:spPr>
-        <p:style>
-          <a:lnRef idx="2">
-            <a:schemeClr val="accent1">
-              <a:shade val="50000"/>
-            </a:schemeClr>
-          </a:lnRef>
-          <a:fillRef idx="1">
-            <a:schemeClr val="accent1"/>
-          </a:fillRef>
-          <a:effectRef idx="0">
-            <a:schemeClr val="accent1"/>
-          </a:effectRef>
-          <a:fontRef idx="minor">
-            <a:schemeClr val="lt1"/>
-          </a:fontRef>
-        </p:style>
-        <p:txBody>
-          <a:bodyPr rtlCol="0" anchor="ctr"/>
-          <a:lstStyle/>
-          <a:p>
-            <a:pPr algn="ctr"/>
-            <a:endParaRPr lang="en-CA"/>
-          </a:p>
-        </p:txBody>
-      </p:sp>
     </p:spTree>
     <p:extLst>
       <p:ext uri="{BB962C8B-B14F-4D97-AF65-F5344CB8AC3E}">
-        <p14:creationId xmlns:p14="http://schemas.microsoft.com/office/powerpoint/2010/main" val="3299438219"/>
+        <p14:creationId xmlns:p14="http://schemas.microsoft.com/office/powerpoint/2010/main" val="1009688993"/>
       </p:ext>
     </p:extLst>
   </p:cSld>
@@ -6567,10 +8615,10 @@
       </p:grpSpPr>
       <p:pic>
         <p:nvPicPr>
-          <p:cNvPr id="3" name="Picture 2">
-            <a:extLst>
-              <a:ext uri="{FF2B5EF4-FFF2-40B4-BE49-F238E27FC236}">
-                <a16:creationId xmlns:a16="http://schemas.microsoft.com/office/drawing/2014/main" id="{06E8A4B3-EF09-4183-84C5-FB0EDA5CC420}"/>
+          <p:cNvPr id="8" name="Picture 7">
+            <a:extLst>
+              <a:ext uri="{FF2B5EF4-FFF2-40B4-BE49-F238E27FC236}">
+                <a16:creationId xmlns:a16="http://schemas.microsoft.com/office/drawing/2014/main" id="{F729CBEA-E679-4238-9425-261FFE912314}"/>
               </a:ext>
             </a:extLst>
           </p:cNvPr>
@@ -6608,8 +8656,8 @@
           <p:nvPr/>
         </p:nvSpPr>
         <p:spPr>
-          <a:xfrm rot="16200000">
-            <a:off x="2432361" y="2727291"/>
+          <a:xfrm rot="10800000">
+            <a:off x="2910447" y="3089337"/>
             <a:ext cx="2536196" cy="784083"/>
           </a:xfrm>
           <a:prstGeom prst="rightArrow">
@@ -6650,7 +8698,7 @@
     </p:spTree>
     <p:extLst>
       <p:ext uri="{BB962C8B-B14F-4D97-AF65-F5344CB8AC3E}">
-        <p14:creationId xmlns:p14="http://schemas.microsoft.com/office/powerpoint/2010/main" val="237635187"/>
+        <p14:creationId xmlns:p14="http://schemas.microsoft.com/office/powerpoint/2010/main" val="3299438219"/>
       </p:ext>
     </p:extLst>
   </p:cSld>
@@ -6682,7 +8730,7 @@
           <p:cNvPr id="3" name="Picture 2">
             <a:extLst>
               <a:ext uri="{FF2B5EF4-FFF2-40B4-BE49-F238E27FC236}">
-                <a16:creationId xmlns:a16="http://schemas.microsoft.com/office/drawing/2014/main" id="{C664E378-8A4C-4B04-A939-5541F9B8630F}"/>
+                <a16:creationId xmlns:a16="http://schemas.microsoft.com/office/drawing/2014/main" id="{06E8A4B3-EF09-4183-84C5-FB0EDA5CC420}"/>
               </a:ext>
             </a:extLst>
           </p:cNvPr>
@@ -6709,10 +8757,10 @@
       </p:pic>
       <p:sp>
         <p:nvSpPr>
-          <p:cNvPr id="6" name="Arrow: Right 5">
-            <a:extLst>
-              <a:ext uri="{FF2B5EF4-FFF2-40B4-BE49-F238E27FC236}">
-                <a16:creationId xmlns:a16="http://schemas.microsoft.com/office/drawing/2014/main" id="{69247FA8-CDF3-416B-876F-C2A8CE221152}"/>
+          <p:cNvPr id="9" name="Arrow: Right 8">
+            <a:extLst>
+              <a:ext uri="{FF2B5EF4-FFF2-40B4-BE49-F238E27FC236}">
+                <a16:creationId xmlns:a16="http://schemas.microsoft.com/office/drawing/2014/main" id="{09C4129A-6CC7-4692-AFF6-BD4224084D43}"/>
               </a:ext>
             </a:extLst>
           </p:cNvPr>
@@ -6759,62 +8807,10 @@
           </a:p>
         </p:txBody>
       </p:sp>
-      <p:sp>
-        <p:nvSpPr>
-          <p:cNvPr id="7" name="Arrow: Right 6">
-            <a:extLst>
-              <a:ext uri="{FF2B5EF4-FFF2-40B4-BE49-F238E27FC236}">
-                <a16:creationId xmlns:a16="http://schemas.microsoft.com/office/drawing/2014/main" id="{935FE570-8858-46BE-9DEF-3749A7BF020C}"/>
-              </a:ext>
-            </a:extLst>
-          </p:cNvPr>
-          <p:cNvSpPr/>
-          <p:nvPr/>
-        </p:nvSpPr>
-        <p:spPr>
-          <a:xfrm rot="2333090">
-            <a:off x="5477770" y="209900"/>
-            <a:ext cx="1399601" cy="627920"/>
-          </a:xfrm>
-          <a:prstGeom prst="rightArrow">
-            <a:avLst/>
-          </a:prstGeom>
-          <a:solidFill>
-            <a:srgbClr val="FF0000"/>
-          </a:solidFill>
-          <a:ln>
-            <a:noFill/>
-          </a:ln>
-        </p:spPr>
-        <p:style>
-          <a:lnRef idx="2">
-            <a:schemeClr val="accent1">
-              <a:shade val="50000"/>
-            </a:schemeClr>
-          </a:lnRef>
-          <a:fillRef idx="1">
-            <a:schemeClr val="accent1"/>
-          </a:fillRef>
-          <a:effectRef idx="0">
-            <a:schemeClr val="accent1"/>
-          </a:effectRef>
-          <a:fontRef idx="minor">
-            <a:schemeClr val="lt1"/>
-          </a:fontRef>
-        </p:style>
-        <p:txBody>
-          <a:bodyPr rtlCol="0" anchor="ctr"/>
-          <a:lstStyle/>
-          <a:p>
-            <a:pPr algn="ctr"/>
-            <a:endParaRPr lang="en-CA"/>
-          </a:p>
-        </p:txBody>
-      </p:sp>
     </p:spTree>
     <p:extLst>
       <p:ext uri="{BB962C8B-B14F-4D97-AF65-F5344CB8AC3E}">
-        <p14:creationId xmlns:p14="http://schemas.microsoft.com/office/powerpoint/2010/main" val="2700146234"/>
+        <p14:creationId xmlns:p14="http://schemas.microsoft.com/office/powerpoint/2010/main" val="237635187"/>
       </p:ext>
     </p:extLst>
   </p:cSld>
@@ -6884,6 +8880,170 @@
 </file>
 
 <file path=ppt/slides/slide20.xml><?xml version="1.0" encoding="utf-8"?>
+<p:sld xmlns:a="http://schemas.openxmlformats.org/drawingml/2006/main" xmlns:r="http://schemas.openxmlformats.org/officeDocument/2006/relationships" xmlns:p="http://schemas.openxmlformats.org/presentationml/2006/main">
+  <p:cSld>
+    <p:spTree>
+      <p:nvGrpSpPr>
+        <p:cNvPr id="1" name=""/>
+        <p:cNvGrpSpPr/>
+        <p:nvPr/>
+      </p:nvGrpSpPr>
+      <p:grpSpPr>
+        <a:xfrm>
+          <a:off x="0" y="0"/>
+          <a:ext cx="0" cy="0"/>
+          <a:chOff x="0" y="0"/>
+          <a:chExt cx="0" cy="0"/>
+        </a:xfrm>
+      </p:grpSpPr>
+      <p:pic>
+        <p:nvPicPr>
+          <p:cNvPr id="3" name="Picture 2">
+            <a:extLst>
+              <a:ext uri="{FF2B5EF4-FFF2-40B4-BE49-F238E27FC236}">
+                <a16:creationId xmlns:a16="http://schemas.microsoft.com/office/drawing/2014/main" id="{C664E378-8A4C-4B04-A939-5541F9B8630F}"/>
+              </a:ext>
+            </a:extLst>
+          </p:cNvPr>
+          <p:cNvPicPr>
+            <a:picLocks noChangeAspect="1"/>
+          </p:cNvPicPr>
+          <p:nvPr/>
+        </p:nvPicPr>
+        <p:blipFill>
+          <a:blip r:embed="rId2"/>
+          <a:stretch>
+            <a:fillRect/>
+          </a:stretch>
+        </p:blipFill>
+        <p:spPr>
+          <a:xfrm>
+            <a:off x="850122" y="0"/>
+            <a:ext cx="10491755" cy="6858000"/>
+          </a:xfrm>
+          <a:prstGeom prst="rect">
+            <a:avLst/>
+          </a:prstGeom>
+        </p:spPr>
+      </p:pic>
+      <p:sp>
+        <p:nvSpPr>
+          <p:cNvPr id="6" name="Arrow: Right 5">
+            <a:extLst>
+              <a:ext uri="{FF2B5EF4-FFF2-40B4-BE49-F238E27FC236}">
+                <a16:creationId xmlns:a16="http://schemas.microsoft.com/office/drawing/2014/main" id="{69247FA8-CDF3-416B-876F-C2A8CE221152}"/>
+              </a:ext>
+            </a:extLst>
+          </p:cNvPr>
+          <p:cNvSpPr/>
+          <p:nvPr/>
+        </p:nvSpPr>
+        <p:spPr>
+          <a:xfrm rot="16200000">
+            <a:off x="2432361" y="2727291"/>
+            <a:ext cx="2536196" cy="784083"/>
+          </a:xfrm>
+          <a:prstGeom prst="rightArrow">
+            <a:avLst/>
+          </a:prstGeom>
+          <a:solidFill>
+            <a:srgbClr val="FF0000"/>
+          </a:solidFill>
+          <a:ln>
+            <a:noFill/>
+          </a:ln>
+        </p:spPr>
+        <p:style>
+          <a:lnRef idx="2">
+            <a:schemeClr val="accent1">
+              <a:shade val="50000"/>
+            </a:schemeClr>
+          </a:lnRef>
+          <a:fillRef idx="1">
+            <a:schemeClr val="accent1"/>
+          </a:fillRef>
+          <a:effectRef idx="0">
+            <a:schemeClr val="accent1"/>
+          </a:effectRef>
+          <a:fontRef idx="minor">
+            <a:schemeClr val="lt1"/>
+          </a:fontRef>
+        </p:style>
+        <p:txBody>
+          <a:bodyPr rtlCol="0" anchor="ctr"/>
+          <a:lstStyle/>
+          <a:p>
+            <a:pPr algn="ctr"/>
+            <a:endParaRPr lang="en-CA"/>
+          </a:p>
+        </p:txBody>
+      </p:sp>
+      <p:sp>
+        <p:nvSpPr>
+          <p:cNvPr id="7" name="Arrow: Right 6">
+            <a:extLst>
+              <a:ext uri="{FF2B5EF4-FFF2-40B4-BE49-F238E27FC236}">
+                <a16:creationId xmlns:a16="http://schemas.microsoft.com/office/drawing/2014/main" id="{935FE570-8858-46BE-9DEF-3749A7BF020C}"/>
+              </a:ext>
+            </a:extLst>
+          </p:cNvPr>
+          <p:cNvSpPr/>
+          <p:nvPr/>
+        </p:nvSpPr>
+        <p:spPr>
+          <a:xfrm rot="2333090">
+            <a:off x="5477770" y="209900"/>
+            <a:ext cx="1399601" cy="627920"/>
+          </a:xfrm>
+          <a:prstGeom prst="rightArrow">
+            <a:avLst/>
+          </a:prstGeom>
+          <a:solidFill>
+            <a:srgbClr val="FF0000"/>
+          </a:solidFill>
+          <a:ln>
+            <a:noFill/>
+          </a:ln>
+        </p:spPr>
+        <p:style>
+          <a:lnRef idx="2">
+            <a:schemeClr val="accent1">
+              <a:shade val="50000"/>
+            </a:schemeClr>
+          </a:lnRef>
+          <a:fillRef idx="1">
+            <a:schemeClr val="accent1"/>
+          </a:fillRef>
+          <a:effectRef idx="0">
+            <a:schemeClr val="accent1"/>
+          </a:effectRef>
+          <a:fontRef idx="minor">
+            <a:schemeClr val="lt1"/>
+          </a:fontRef>
+        </p:style>
+        <p:txBody>
+          <a:bodyPr rtlCol="0" anchor="ctr"/>
+          <a:lstStyle/>
+          <a:p>
+            <a:pPr algn="ctr"/>
+            <a:endParaRPr lang="en-CA"/>
+          </a:p>
+        </p:txBody>
+      </p:sp>
+    </p:spTree>
+    <p:extLst>
+      <p:ext uri="{BB962C8B-B14F-4D97-AF65-F5344CB8AC3E}">
+        <p14:creationId xmlns:p14="http://schemas.microsoft.com/office/powerpoint/2010/main" val="2700146234"/>
+      </p:ext>
+    </p:extLst>
+  </p:cSld>
+  <p:clrMapOvr>
+    <a:masterClrMapping/>
+  </p:clrMapOvr>
+</p:sld>
+</file>
+
+<file path=ppt/slides/slide21.xml><?xml version="1.0" encoding="utf-8"?>
 <p:sld xmlns:a="http://schemas.openxmlformats.org/drawingml/2006/main" xmlns:r="http://schemas.openxmlformats.org/officeDocument/2006/relationships" xmlns:p="http://schemas.openxmlformats.org/presentationml/2006/main">
   <p:cSld>
     <p:spTree>

</xml_diff>